<commit_message>
předělání robust matcher a přidani testovani KL
</commit_message>
<xml_diff>
--- a/doc/ISP_prezentace.pptx
+++ b/doc/ISP_prezentace.pptx
@@ -8,10 +8,12 @@
     <p:sldId id="256" r:id="rId2"/>
     <p:sldId id="257" r:id="rId3"/>
     <p:sldId id="260" r:id="rId4"/>
-    <p:sldId id="262" r:id="rId5"/>
-    <p:sldId id="258" r:id="rId6"/>
-    <p:sldId id="259" r:id="rId7"/>
-    <p:sldId id="261" r:id="rId8"/>
+    <p:sldId id="261" r:id="rId5"/>
+    <p:sldId id="262" r:id="rId6"/>
+    <p:sldId id="264" r:id="rId7"/>
+    <p:sldId id="263" r:id="rId8"/>
+    <p:sldId id="258" r:id="rId9"/>
+    <p:sldId id="259" r:id="rId10"/>
   </p:sldIdLst>
   <p:sldSz cx="12192000" cy="6858000"/>
   <p:notesSz cx="6858000" cy="9144000"/>
@@ -2077,6 +2079,13 @@
         </dgm:presLayoutVars>
       </dgm:prSet>
       <dgm:spPr/>
+      <dgm:t>
+        <a:bodyPr/>
+        <a:lstStyle/>
+        <a:p>
+          <a:endParaRPr lang="cs-CZ"/>
+        </a:p>
+      </dgm:t>
     </dgm:pt>
     <dgm:pt modelId="{E67650BA-9CE9-4748-8764-12DFD203F2E4}" type="pres">
       <dgm:prSet presAssocID="{7009181E-638E-42B7-B503-04682E7DBF8B}" presName="hierRoot1" presStyleCnt="0">
@@ -2097,6 +2106,13 @@
         </dgm:presLayoutVars>
       </dgm:prSet>
       <dgm:spPr/>
+      <dgm:t>
+        <a:bodyPr/>
+        <a:lstStyle/>
+        <a:p>
+          <a:endParaRPr lang="cs-CZ"/>
+        </a:p>
+      </dgm:t>
     </dgm:pt>
     <dgm:pt modelId="{BC9E5801-133A-4A10-A5CB-4E77979551B3}" type="pres">
       <dgm:prSet presAssocID="{7009181E-638E-42B7-B503-04682E7DBF8B}" presName="topArc1" presStyleLbl="parChTrans1D1" presStyleIdx="0" presStyleCnt="6"/>
@@ -2109,6 +2125,13 @@
     <dgm:pt modelId="{91C11B3D-1D3E-4504-8047-D2D297946D6A}" type="pres">
       <dgm:prSet presAssocID="{7009181E-638E-42B7-B503-04682E7DBF8B}" presName="topConnNode1" presStyleLbl="node1" presStyleIdx="0" presStyleCnt="0"/>
       <dgm:spPr/>
+      <dgm:t>
+        <a:bodyPr/>
+        <a:lstStyle/>
+        <a:p>
+          <a:endParaRPr lang="cs-CZ"/>
+        </a:p>
+      </dgm:t>
     </dgm:pt>
     <dgm:pt modelId="{ABDD2E58-E41E-49F5-9F50-B3424288486B}" type="pres">
       <dgm:prSet presAssocID="{7009181E-638E-42B7-B503-04682E7DBF8B}" presName="hierChild2" presStyleCnt="0"/>
@@ -2117,6 +2140,13 @@
     <dgm:pt modelId="{E7177388-EB6E-453D-A761-30B17B5091A8}" type="pres">
       <dgm:prSet presAssocID="{5CCB1E11-3A49-4B8F-AB36-40DCB0CCF222}" presName="Name28" presStyleLbl="parChTrans1D2" presStyleIdx="0" presStyleCnt="2"/>
       <dgm:spPr/>
+      <dgm:t>
+        <a:bodyPr/>
+        <a:lstStyle/>
+        <a:p>
+          <a:endParaRPr lang="cs-CZ"/>
+        </a:p>
+      </dgm:t>
     </dgm:pt>
     <dgm:pt modelId="{38A4A3B2-E34B-4EDC-8803-D1F9EC02044A}" type="pres">
       <dgm:prSet presAssocID="{8E388B11-3F17-49AF-ABDA-B6F826AD92F9}" presName="hierRoot2" presStyleCnt="0">
@@ -2137,6 +2167,13 @@
         </dgm:presLayoutVars>
       </dgm:prSet>
       <dgm:spPr/>
+      <dgm:t>
+        <a:bodyPr/>
+        <a:lstStyle/>
+        <a:p>
+          <a:endParaRPr lang="cs-CZ"/>
+        </a:p>
+      </dgm:t>
     </dgm:pt>
     <dgm:pt modelId="{9F87BEBD-B993-4865-BC40-3CF847E3EF29}" type="pres">
       <dgm:prSet presAssocID="{8E388B11-3F17-49AF-ABDA-B6F826AD92F9}" presName="topArc2" presStyleLbl="parChTrans1D1" presStyleIdx="2" presStyleCnt="6"/>
@@ -2149,6 +2186,13 @@
     <dgm:pt modelId="{0307CF5D-201D-456B-A5D1-F09067EB146D}" type="pres">
       <dgm:prSet presAssocID="{8E388B11-3F17-49AF-ABDA-B6F826AD92F9}" presName="topConnNode2" presStyleLbl="node2" presStyleIdx="0" presStyleCnt="0"/>
       <dgm:spPr/>
+      <dgm:t>
+        <a:bodyPr/>
+        <a:lstStyle/>
+        <a:p>
+          <a:endParaRPr lang="cs-CZ"/>
+        </a:p>
+      </dgm:t>
     </dgm:pt>
     <dgm:pt modelId="{CB6E2FCF-0097-428E-9A04-4277282B875E}" type="pres">
       <dgm:prSet presAssocID="{8E388B11-3F17-49AF-ABDA-B6F826AD92F9}" presName="hierChild4" presStyleCnt="0"/>
@@ -2161,6 +2205,13 @@
     <dgm:pt modelId="{81EEF6D2-1617-4371-B7C2-A4CEA969F4C5}" type="pres">
       <dgm:prSet presAssocID="{7164AE45-091A-4A8F-9A30-2277FA6BF322}" presName="Name28" presStyleLbl="parChTrans1D2" presStyleIdx="1" presStyleCnt="2"/>
       <dgm:spPr/>
+      <dgm:t>
+        <a:bodyPr/>
+        <a:lstStyle/>
+        <a:p>
+          <a:endParaRPr lang="cs-CZ"/>
+        </a:p>
+      </dgm:t>
     </dgm:pt>
     <dgm:pt modelId="{CAAF6927-4694-4C63-9ECD-9755AD4D43FB}" type="pres">
       <dgm:prSet presAssocID="{E6144ECF-4E01-4085-B37A-615E6C9C76E4}" presName="hierRoot2" presStyleCnt="0">
@@ -2181,6 +2232,13 @@
         </dgm:presLayoutVars>
       </dgm:prSet>
       <dgm:spPr/>
+      <dgm:t>
+        <a:bodyPr/>
+        <a:lstStyle/>
+        <a:p>
+          <a:endParaRPr lang="cs-CZ"/>
+        </a:p>
+      </dgm:t>
     </dgm:pt>
     <dgm:pt modelId="{9DD10EF7-FE0B-48F4-A210-6FA9B5DF3BCD}" type="pres">
       <dgm:prSet presAssocID="{E6144ECF-4E01-4085-B37A-615E6C9C76E4}" presName="topArc2" presStyleLbl="parChTrans1D1" presStyleIdx="4" presStyleCnt="6"/>
@@ -2193,6 +2251,13 @@
     <dgm:pt modelId="{E8BD95C4-8CC3-4AC7-A732-1F55FB829EA1}" type="pres">
       <dgm:prSet presAssocID="{E6144ECF-4E01-4085-B37A-615E6C9C76E4}" presName="topConnNode2" presStyleLbl="node2" presStyleIdx="0" presStyleCnt="0"/>
       <dgm:spPr/>
+      <dgm:t>
+        <a:bodyPr/>
+        <a:lstStyle/>
+        <a:p>
+          <a:endParaRPr lang="cs-CZ"/>
+        </a:p>
+      </dgm:t>
     </dgm:pt>
     <dgm:pt modelId="{CD9016E6-7410-4033-8C49-AC1D30EA2088}" type="pres">
       <dgm:prSet presAssocID="{E6144ECF-4E01-4085-B37A-615E6C9C76E4}" presName="hierChild4" presStyleCnt="0"/>
@@ -2208,18 +2273,18 @@
     </dgm:pt>
   </dgm:ptLst>
   <dgm:cxnLst>
-    <dgm:cxn modelId="{C3ADD324-CBD7-4166-ABED-196C401B664B}" type="presOf" srcId="{DC603501-88BC-4276-987B-0660956F9026}" destId="{FF668E03-D7E5-4952-8FF0-8B8BC363F1CF}" srcOrd="0" destOrd="0" presId="urn:microsoft.com/office/officeart/2008/layout/HalfCircleOrganizationChart"/>
-    <dgm:cxn modelId="{E5492E41-6860-4F62-AC63-7B4FEA0E3B7A}" type="presOf" srcId="{8E388B11-3F17-49AF-ABDA-B6F826AD92F9}" destId="{0307CF5D-201D-456B-A5D1-F09067EB146D}" srcOrd="1" destOrd="0" presId="urn:microsoft.com/office/officeart/2008/layout/HalfCircleOrganizationChart"/>
-    <dgm:cxn modelId="{A80DE5DB-4BB9-4097-AC94-5B5D536F12B6}" type="presOf" srcId="{7009181E-638E-42B7-B503-04682E7DBF8B}" destId="{16BBD506-B279-4466-8938-886EF0467E61}" srcOrd="0" destOrd="0" presId="urn:microsoft.com/office/officeart/2008/layout/HalfCircleOrganizationChart"/>
-    <dgm:cxn modelId="{BD0DB0A6-7A81-461E-8040-097E5A1920E5}" type="presOf" srcId="{E6144ECF-4E01-4085-B37A-615E6C9C76E4}" destId="{69BE21C6-CF53-46E7-8B11-140CC76B57DF}" srcOrd="0" destOrd="0" presId="urn:microsoft.com/office/officeart/2008/layout/HalfCircleOrganizationChart"/>
-    <dgm:cxn modelId="{D15AFEFF-A283-4450-8F36-EC3D919143DB}" srcId="{7009181E-638E-42B7-B503-04682E7DBF8B}" destId="{E6144ECF-4E01-4085-B37A-615E6C9C76E4}" srcOrd="1" destOrd="0" parTransId="{7164AE45-091A-4A8F-9A30-2277FA6BF322}" sibTransId="{ABD30387-E8AD-4D67-BE81-C009A22FD525}"/>
-    <dgm:cxn modelId="{A79FD6D0-1D27-4CA8-A75A-C55C68128478}" type="presOf" srcId="{E6144ECF-4E01-4085-B37A-615E6C9C76E4}" destId="{E8BD95C4-8CC3-4AC7-A732-1F55FB829EA1}" srcOrd="1" destOrd="0" presId="urn:microsoft.com/office/officeart/2008/layout/HalfCircleOrganizationChart"/>
+    <dgm:cxn modelId="{3AB4D3AA-4327-4CE1-A61D-BDE20B291E3C}" srcId="{7009181E-638E-42B7-B503-04682E7DBF8B}" destId="{8E388B11-3F17-49AF-ABDA-B6F826AD92F9}" srcOrd="0" destOrd="0" parTransId="{5CCB1E11-3A49-4B8F-AB36-40DCB0CCF222}" sibTransId="{E8ABABCB-0B2A-40FD-ABEF-AA0DC0A73C8F}"/>
     <dgm:cxn modelId="{5B752452-DA8D-4D0B-82FE-58D1B17D68AE}" type="presOf" srcId="{5CCB1E11-3A49-4B8F-AB36-40DCB0CCF222}" destId="{E7177388-EB6E-453D-A761-30B17B5091A8}" srcOrd="0" destOrd="0" presId="urn:microsoft.com/office/officeart/2008/layout/HalfCircleOrganizationChart"/>
     <dgm:cxn modelId="{A721445F-2A84-48B7-9A84-62D1E1A05BFA}" type="presOf" srcId="{7164AE45-091A-4A8F-9A30-2277FA6BF322}" destId="{81EEF6D2-1617-4371-B7C2-A4CEA969F4C5}" srcOrd="0" destOrd="0" presId="urn:microsoft.com/office/officeart/2008/layout/HalfCircleOrganizationChart"/>
-    <dgm:cxn modelId="{3AB4D3AA-4327-4CE1-A61D-BDE20B291E3C}" srcId="{7009181E-638E-42B7-B503-04682E7DBF8B}" destId="{8E388B11-3F17-49AF-ABDA-B6F826AD92F9}" srcOrd="0" destOrd="0" parTransId="{5CCB1E11-3A49-4B8F-AB36-40DCB0CCF222}" sibTransId="{E8ABABCB-0B2A-40FD-ABEF-AA0DC0A73C8F}"/>
     <dgm:cxn modelId="{1B1C2917-370A-414B-8E42-9ED2155FBFEC}" type="presOf" srcId="{7009181E-638E-42B7-B503-04682E7DBF8B}" destId="{91C11B3D-1D3E-4504-8047-D2D297946D6A}" srcOrd="1" destOrd="0" presId="urn:microsoft.com/office/officeart/2008/layout/HalfCircleOrganizationChart"/>
     <dgm:cxn modelId="{6FB53852-F7D1-4693-B833-7E8E26C05AE5}" type="presOf" srcId="{8E388B11-3F17-49AF-ABDA-B6F826AD92F9}" destId="{81412828-54F0-44BA-A945-0411401F368A}" srcOrd="0" destOrd="0" presId="urn:microsoft.com/office/officeart/2008/layout/HalfCircleOrganizationChart"/>
     <dgm:cxn modelId="{DE3E5D52-E210-4CCF-A573-FA1D2CE4B941}" srcId="{DC603501-88BC-4276-987B-0660956F9026}" destId="{7009181E-638E-42B7-B503-04682E7DBF8B}" srcOrd="0" destOrd="0" parTransId="{123D9E53-892C-4DD3-B28C-4E3E749206D2}" sibTransId="{3CEA6B7E-2DA0-41D1-B252-52E75632E4DD}"/>
+    <dgm:cxn modelId="{A80DE5DB-4BB9-4097-AC94-5B5D536F12B6}" type="presOf" srcId="{7009181E-638E-42B7-B503-04682E7DBF8B}" destId="{16BBD506-B279-4466-8938-886EF0467E61}" srcOrd="0" destOrd="0" presId="urn:microsoft.com/office/officeart/2008/layout/HalfCircleOrganizationChart"/>
+    <dgm:cxn modelId="{A79FD6D0-1D27-4CA8-A75A-C55C68128478}" type="presOf" srcId="{E6144ECF-4E01-4085-B37A-615E6C9C76E4}" destId="{E8BD95C4-8CC3-4AC7-A732-1F55FB829EA1}" srcOrd="1" destOrd="0" presId="urn:microsoft.com/office/officeart/2008/layout/HalfCircleOrganizationChart"/>
+    <dgm:cxn modelId="{BD0DB0A6-7A81-461E-8040-097E5A1920E5}" type="presOf" srcId="{E6144ECF-4E01-4085-B37A-615E6C9C76E4}" destId="{69BE21C6-CF53-46E7-8B11-140CC76B57DF}" srcOrd="0" destOrd="0" presId="urn:microsoft.com/office/officeart/2008/layout/HalfCircleOrganizationChart"/>
+    <dgm:cxn modelId="{C3ADD324-CBD7-4166-ABED-196C401B664B}" type="presOf" srcId="{DC603501-88BC-4276-987B-0660956F9026}" destId="{FF668E03-D7E5-4952-8FF0-8B8BC363F1CF}" srcOrd="0" destOrd="0" presId="urn:microsoft.com/office/officeart/2008/layout/HalfCircleOrganizationChart"/>
+    <dgm:cxn modelId="{E5492E41-6860-4F62-AC63-7B4FEA0E3B7A}" type="presOf" srcId="{8E388B11-3F17-49AF-ABDA-B6F826AD92F9}" destId="{0307CF5D-201D-456B-A5D1-F09067EB146D}" srcOrd="1" destOrd="0" presId="urn:microsoft.com/office/officeart/2008/layout/HalfCircleOrganizationChart"/>
+    <dgm:cxn modelId="{D15AFEFF-A283-4450-8F36-EC3D919143DB}" srcId="{7009181E-638E-42B7-B503-04682E7DBF8B}" destId="{E6144ECF-4E01-4085-B37A-615E6C9C76E4}" srcOrd="1" destOrd="0" parTransId="{7164AE45-091A-4A8F-9A30-2277FA6BF322}" sibTransId="{ABD30387-E8AD-4D67-BE81-C009A22FD525}"/>
     <dgm:cxn modelId="{DEE7D028-61B2-4D9D-AF58-763D901C8D3B}" type="presParOf" srcId="{FF668E03-D7E5-4952-8FF0-8B8BC363F1CF}" destId="{E67650BA-9CE9-4748-8764-12DFD203F2E4}" srcOrd="0" destOrd="0" presId="urn:microsoft.com/office/officeart/2008/layout/HalfCircleOrganizationChart"/>
     <dgm:cxn modelId="{00640DDE-1FE6-415C-8804-A7EE0562E116}" type="presParOf" srcId="{E67650BA-9CE9-4748-8764-12DFD203F2E4}" destId="{BAF25ADA-F1B0-4141-9361-CA7B4CB4A46A}" srcOrd="0" destOrd="0" presId="urn:microsoft.com/office/officeart/2008/layout/HalfCircleOrganizationChart"/>
     <dgm:cxn modelId="{A2A1CE82-A877-4698-9C57-7141FBA40F8A}" type="presParOf" srcId="{BAF25ADA-F1B0-4141-9361-CA7B4CB4A46A}" destId="{16BBD506-B279-4466-8938-886EF0467E61}" srcOrd="0" destOrd="0" presId="urn:microsoft.com/office/officeart/2008/layout/HalfCircleOrganizationChart"/>
@@ -8158,7 +8223,7 @@
           <a:p>
             <a:fld id="{D6A286D6-9690-4A7E-B0B1-9858359D4024}" type="datetimeFigureOut">
               <a:rPr lang="cs-CZ" smtClean="0"/>
-              <a:t>22.01.2017</a:t>
+              <a:t>25.01.2017</a:t>
             </a:fld>
             <a:endParaRPr lang="cs-CZ"/>
           </a:p>
@@ -8409,7 +8474,7 @@
           <a:p>
             <a:fld id="{D6A286D6-9690-4A7E-B0B1-9858359D4024}" type="datetimeFigureOut">
               <a:rPr lang="cs-CZ" smtClean="0"/>
-              <a:t>22.01.2017</a:t>
+              <a:t>25.01.2017</a:t>
             </a:fld>
             <a:endParaRPr lang="cs-CZ"/>
           </a:p>
@@ -8723,7 +8788,7 @@
           <a:p>
             <a:fld id="{D6A286D6-9690-4A7E-B0B1-9858359D4024}" type="datetimeFigureOut">
               <a:rPr lang="cs-CZ" smtClean="0"/>
-              <a:t>22.01.2017</a:t>
+              <a:t>25.01.2017</a:t>
             </a:fld>
             <a:endParaRPr lang="cs-CZ"/>
           </a:p>
@@ -9064,7 +9129,7 @@
           <a:p>
             <a:fld id="{D6A286D6-9690-4A7E-B0B1-9858359D4024}" type="datetimeFigureOut">
               <a:rPr lang="cs-CZ" smtClean="0"/>
-              <a:t>22.01.2017</a:t>
+              <a:t>25.01.2017</a:t>
             </a:fld>
             <a:endParaRPr lang="cs-CZ"/>
           </a:p>
@@ -9378,7 +9443,7 @@
           <a:p>
             <a:fld id="{D6A286D6-9690-4A7E-B0B1-9858359D4024}" type="datetimeFigureOut">
               <a:rPr lang="cs-CZ" smtClean="0"/>
-              <a:t>22.01.2017</a:t>
+              <a:t>25.01.2017</a:t>
             </a:fld>
             <a:endParaRPr lang="cs-CZ"/>
           </a:p>
@@ -9771,7 +9836,7 @@
           <a:p>
             <a:fld id="{D6A286D6-9690-4A7E-B0B1-9858359D4024}" type="datetimeFigureOut">
               <a:rPr lang="cs-CZ" smtClean="0"/>
-              <a:t>22.01.2017</a:t>
+              <a:t>25.01.2017</a:t>
             </a:fld>
             <a:endParaRPr lang="cs-CZ"/>
           </a:p>
@@ -9941,7 +10006,7 @@
           <a:p>
             <a:fld id="{D6A286D6-9690-4A7E-B0B1-9858359D4024}" type="datetimeFigureOut">
               <a:rPr lang="cs-CZ" smtClean="0"/>
-              <a:t>22.01.2017</a:t>
+              <a:t>25.01.2017</a:t>
             </a:fld>
             <a:endParaRPr lang="cs-CZ"/>
           </a:p>
@@ -10121,7 +10186,7 @@
           <a:p>
             <a:fld id="{D6A286D6-9690-4A7E-B0B1-9858359D4024}" type="datetimeFigureOut">
               <a:rPr lang="cs-CZ" smtClean="0"/>
-              <a:t>22.01.2017</a:t>
+              <a:t>25.01.2017</a:t>
             </a:fld>
             <a:endParaRPr lang="cs-CZ"/>
           </a:p>
@@ -10297,7 +10362,7 @@
           <a:p>
             <a:fld id="{D6A286D6-9690-4A7E-B0B1-9858359D4024}" type="datetimeFigureOut">
               <a:rPr lang="cs-CZ" smtClean="0"/>
-              <a:t>22.01.2017</a:t>
+              <a:t>25.01.2017</a:t>
             </a:fld>
             <a:endParaRPr lang="cs-CZ"/>
           </a:p>
@@ -10544,7 +10609,7 @@
           <a:p>
             <a:fld id="{D6A286D6-9690-4A7E-B0B1-9858359D4024}" type="datetimeFigureOut">
               <a:rPr lang="cs-CZ" smtClean="0"/>
-              <a:t>22.01.2017</a:t>
+              <a:t>25.01.2017</a:t>
             </a:fld>
             <a:endParaRPr lang="cs-CZ"/>
           </a:p>
@@ -10776,7 +10841,7 @@
           <a:p>
             <a:fld id="{D6A286D6-9690-4A7E-B0B1-9858359D4024}" type="datetimeFigureOut">
               <a:rPr lang="cs-CZ" smtClean="0"/>
-              <a:t>22.01.2017</a:t>
+              <a:t>25.01.2017</a:t>
             </a:fld>
             <a:endParaRPr lang="cs-CZ"/>
           </a:p>
@@ -11150,7 +11215,7 @@
           <a:p>
             <a:fld id="{D6A286D6-9690-4A7E-B0B1-9858359D4024}" type="datetimeFigureOut">
               <a:rPr lang="cs-CZ" smtClean="0"/>
-              <a:t>22.01.2017</a:t>
+              <a:t>25.01.2017</a:t>
             </a:fld>
             <a:endParaRPr lang="cs-CZ"/>
           </a:p>
@@ -11273,7 +11338,7 @@
           <a:p>
             <a:fld id="{D6A286D6-9690-4A7E-B0B1-9858359D4024}" type="datetimeFigureOut">
               <a:rPr lang="cs-CZ" smtClean="0"/>
-              <a:t>22.01.2017</a:t>
+              <a:t>25.01.2017</a:t>
             </a:fld>
             <a:endParaRPr lang="cs-CZ"/>
           </a:p>
@@ -11368,7 +11433,7 @@
           <a:p>
             <a:fld id="{D6A286D6-9690-4A7E-B0B1-9858359D4024}" type="datetimeFigureOut">
               <a:rPr lang="cs-CZ" smtClean="0"/>
-              <a:t>22.01.2017</a:t>
+              <a:t>25.01.2017</a:t>
             </a:fld>
             <a:endParaRPr lang="cs-CZ"/>
           </a:p>
@@ -11623,7 +11688,7 @@
           <a:p>
             <a:fld id="{D6A286D6-9690-4A7E-B0B1-9858359D4024}" type="datetimeFigureOut">
               <a:rPr lang="cs-CZ" smtClean="0"/>
-              <a:t>22.01.2017</a:t>
+              <a:t>25.01.2017</a:t>
             </a:fld>
             <a:endParaRPr lang="cs-CZ"/>
           </a:p>
@@ -11886,7 +11951,7 @@
           <a:p>
             <a:fld id="{D6A286D6-9690-4A7E-B0B1-9858359D4024}" type="datetimeFigureOut">
               <a:rPr lang="cs-CZ" smtClean="0"/>
-              <a:t>22.01.2017</a:t>
+              <a:t>25.01.2017</a:t>
             </a:fld>
             <a:endParaRPr lang="cs-CZ"/>
           </a:p>
@@ -12629,7 +12694,7 @@
           <a:p>
             <a:fld id="{D6A286D6-9690-4A7E-B0B1-9858359D4024}" type="datetimeFigureOut">
               <a:rPr lang="cs-CZ" smtClean="0"/>
-              <a:t>22.01.2017</a:t>
+              <a:t>25.01.2017</a:t>
             </a:fld>
             <a:endParaRPr lang="cs-CZ"/>
           </a:p>
@@ -13212,15 +13277,7 @@
             </a:r>
             <a:r>
               <a:rPr lang="cs-CZ" sz="2800" dirty="0" smtClean="0"/>
-              <a:t>Autor: </a:t>
-            </a:r>
-            <a:r>
-              <a:rPr lang="cs-CZ" sz="2800" dirty="0" smtClean="0"/>
-              <a:t>		Adam </a:t>
-            </a:r>
-            <a:r>
-              <a:rPr lang="cs-CZ" sz="2800" dirty="0" smtClean="0"/>
-              <a:t>Červenka</a:t>
+              <a:t>Autor: 		Adam Červenka</a:t>
             </a:r>
             <a:endParaRPr lang="en-US" sz="2800" dirty="0" smtClean="0"/>
           </a:p>
@@ -13295,7 +13352,7 @@
 </file>
 
 <file path=ppt/slides/slide2.xml><?xml version="1.0" encoding="utf-8"?>
-<p:sld xmlns:a="http://schemas.openxmlformats.org/drawingml/2006/main" xmlns:r="http://schemas.openxmlformats.org/officeDocument/2006/relationships" xmlns:p="http://schemas.openxmlformats.org/presentationml/2006/main">
+<p:sld xmlns:a="http://schemas.openxmlformats.org/drawingml/2006/main" xmlns:r="http://schemas.openxmlformats.org/officeDocument/2006/relationships" xmlns:p="http://schemas.openxmlformats.org/presentationml/2006/main" show="0">
   <p:cSld>
     <p:spTree>
       <p:nvGrpSpPr>
@@ -13410,6 +13467,14 @@
   <p:clrMapOvr>
     <a:masterClrMapping/>
   </p:clrMapOvr>
+  <mc:AlternateContent xmlns:mc="http://schemas.openxmlformats.org/markup-compatibility/2006" xmlns:p14="http://schemas.microsoft.com/office/powerpoint/2010/main">
+    <mc:Choice Requires="p14">
+      <p:transition spd="slow" p14:dur="2000"/>
+    </mc:Choice>
+    <mc:Fallback xmlns="">
+      <p:transition spd="slow"/>
+    </mc:Fallback>
+  </mc:AlternateContent>
   <p:timing>
     <p:tnLst>
       <p:par>
@@ -13421,7 +13486,7 @@
 </file>
 
 <file path=ppt/slides/slide3.xml><?xml version="1.0" encoding="utf-8"?>
-<p:sld xmlns:a="http://schemas.openxmlformats.org/drawingml/2006/main" xmlns:r="http://schemas.openxmlformats.org/officeDocument/2006/relationships" xmlns:p="http://schemas.openxmlformats.org/presentationml/2006/main">
+<p:sld xmlns:a="http://schemas.openxmlformats.org/drawingml/2006/main" xmlns:r="http://schemas.openxmlformats.org/officeDocument/2006/relationships" xmlns:p="http://schemas.openxmlformats.org/presentationml/2006/main" show="0">
   <p:cSld>
     <p:spTree>
       <p:nvGrpSpPr>
@@ -13503,6 +13568,14 @@
   <p:clrMapOvr>
     <a:masterClrMapping/>
   </p:clrMapOvr>
+  <mc:AlternateContent xmlns:mc="http://schemas.openxmlformats.org/markup-compatibility/2006" xmlns:p14="http://schemas.microsoft.com/office/powerpoint/2010/main">
+    <mc:Choice Requires="p14">
+      <p:transition spd="slow" p14:dur="2000"/>
+    </mc:Choice>
+    <mc:Fallback xmlns="">
+      <p:transition spd="slow"/>
+    </mc:Fallback>
+  </mc:AlternateContent>
   <p:timing>
     <p:tnLst>
       <p:par>
@@ -13514,255 +13587,6 @@
 </file>
 
 <file path=ppt/slides/slide4.xml><?xml version="1.0" encoding="utf-8"?>
-<p:sld xmlns:a="http://schemas.openxmlformats.org/drawingml/2006/main" xmlns:r="http://schemas.openxmlformats.org/officeDocument/2006/relationships" xmlns:p="http://schemas.openxmlformats.org/presentationml/2006/main">
-  <p:cSld>
-    <p:spTree>
-      <p:nvGrpSpPr>
-        <p:cNvPr id="1" name=""/>
-        <p:cNvGrpSpPr/>
-        <p:nvPr/>
-      </p:nvGrpSpPr>
-      <p:grpSpPr>
-        <a:xfrm>
-          <a:off x="0" y="0"/>
-          <a:ext cx="0" cy="0"/>
-          <a:chOff x="0" y="0"/>
-          <a:chExt cx="0" cy="0"/>
-        </a:xfrm>
-      </p:grpSpPr>
-      <p:sp>
-        <p:nvSpPr>
-          <p:cNvPr id="2" name="Nadpis 1"/>
-          <p:cNvSpPr>
-            <a:spLocks noGrp="1"/>
-          </p:cNvSpPr>
-          <p:nvPr>
-            <p:ph type="title"/>
-          </p:nvPr>
-        </p:nvSpPr>
-        <p:spPr/>
-        <p:txBody>
-          <a:bodyPr/>
-          <a:lstStyle/>
-          <a:p>
-            <a:r>
-              <a:rPr lang="en-US" dirty="0" err="1" smtClean="0">
-                <a:solidFill>
-                  <a:schemeClr val="tx1"/>
-                </a:solidFill>
-              </a:rPr>
-              <a:t>Reali</a:t>
-            </a:r>
-            <a:r>
-              <a:rPr lang="cs-CZ" dirty="0" smtClean="0">
-                <a:solidFill>
-                  <a:schemeClr val="tx1"/>
-                </a:solidFill>
-              </a:rPr>
-              <a:t>z</a:t>
-            </a:r>
-            <a:r>
-              <a:rPr lang="en-US" dirty="0" smtClean="0">
-                <a:solidFill>
-                  <a:schemeClr val="tx1"/>
-                </a:solidFill>
-              </a:rPr>
-              <a:t>ace</a:t>
-            </a:r>
-            <a:r>
-              <a:rPr lang="cs-CZ" dirty="0" smtClean="0">
-                <a:solidFill>
-                  <a:schemeClr val="tx1"/>
-                </a:solidFill>
-              </a:rPr>
-              <a:t> a vývoj</a:t>
-            </a:r>
-            <a:endParaRPr lang="cs-CZ" dirty="0">
-              <a:solidFill>
-                <a:schemeClr val="tx1"/>
-              </a:solidFill>
-            </a:endParaRPr>
-          </a:p>
-        </p:txBody>
-      </p:sp>
-      <p:graphicFrame>
-        <p:nvGraphicFramePr>
-          <p:cNvPr id="4" name="Zástupný symbol pro obsah 3"/>
-          <p:cNvGraphicFramePr>
-            <a:graphicFrameLocks noGrp="1"/>
-          </p:cNvGraphicFramePr>
-          <p:nvPr>
-            <p:ph idx="1"/>
-            <p:extLst>
-              <p:ext uri="{D42A27DB-BD31-4B8C-83A1-F6EECF244321}">
-                <p14:modId xmlns:p14="http://schemas.microsoft.com/office/powerpoint/2010/main" val="2838630033"/>
-              </p:ext>
-            </p:extLst>
-          </p:nvPr>
-        </p:nvGraphicFramePr>
-        <p:xfrm>
-          <a:off x="677863" y="2160588"/>
-          <a:ext cx="8596312" cy="3881437"/>
-        </p:xfrm>
-        <a:graphic>
-          <a:graphicData uri="http://schemas.openxmlformats.org/drawingml/2006/diagram">
-            <dgm:relIds xmlns:dgm="http://schemas.openxmlformats.org/drawingml/2006/diagram" xmlns:r="http://schemas.openxmlformats.org/officeDocument/2006/relationships" r:dm="rId2" r:lo="rId3" r:qs="rId4" r:cs="rId5"/>
-          </a:graphicData>
-        </a:graphic>
-      </p:graphicFrame>
-    </p:spTree>
-    <p:extLst>
-      <p:ext uri="{BB962C8B-B14F-4D97-AF65-F5344CB8AC3E}">
-        <p14:creationId xmlns:p14="http://schemas.microsoft.com/office/powerpoint/2010/main" val="290709890"/>
-      </p:ext>
-    </p:extLst>
-  </p:cSld>
-  <p:clrMapOvr>
-    <a:masterClrMapping/>
-  </p:clrMapOvr>
-  <p:timing>
-    <p:tnLst>
-      <p:par>
-        <p:cTn id="1" dur="indefinite" restart="never" nodeType="tmRoot"/>
-      </p:par>
-    </p:tnLst>
-  </p:timing>
-</p:sld>
-</file>
-
-<file path=ppt/slides/slide5.xml><?xml version="1.0" encoding="utf-8"?>
-<p:sld xmlns:a="http://schemas.openxmlformats.org/drawingml/2006/main" xmlns:r="http://schemas.openxmlformats.org/officeDocument/2006/relationships" xmlns:p="http://schemas.openxmlformats.org/presentationml/2006/main">
-  <p:cSld>
-    <p:spTree>
-      <p:nvGrpSpPr>
-        <p:cNvPr id="1" name=""/>
-        <p:cNvGrpSpPr/>
-        <p:nvPr/>
-      </p:nvGrpSpPr>
-      <p:grpSpPr>
-        <a:xfrm>
-          <a:off x="0" y="0"/>
-          <a:ext cx="0" cy="0"/>
-          <a:chOff x="0" y="0"/>
-          <a:chExt cx="0" cy="0"/>
-        </a:xfrm>
-      </p:grpSpPr>
-      <p:pic>
-        <p:nvPicPr>
-          <p:cNvPr id="5" name="Zástupný symbol pro obsah 4"/>
-          <p:cNvPicPr>
-            <a:picLocks noGrp="1" noChangeAspect="1"/>
-          </p:cNvPicPr>
-          <p:nvPr>
-            <p:ph idx="1"/>
-          </p:nvPr>
-        </p:nvPicPr>
-        <p:blipFill>
-          <a:blip r:embed="rId2">
-            <a:extLst>
-              <a:ext uri="{28A0092B-C50C-407E-A947-70E740481C1C}">
-                <a14:useLocalDpi xmlns:a14="http://schemas.microsoft.com/office/drawing/2010/main" val="0"/>
-              </a:ext>
-            </a:extLst>
-          </a:blip>
-          <a:stretch>
-            <a:fillRect/>
-          </a:stretch>
-        </p:blipFill>
-        <p:spPr>
-          <a:xfrm>
-            <a:off x="499749" y="147061"/>
-            <a:ext cx="7129487" cy="6384488"/>
-          </a:xfrm>
-        </p:spPr>
-      </p:pic>
-    </p:spTree>
-    <p:extLst>
-      <p:ext uri="{BB962C8B-B14F-4D97-AF65-F5344CB8AC3E}">
-        <p14:creationId xmlns:p14="http://schemas.microsoft.com/office/powerpoint/2010/main" val="292424517"/>
-      </p:ext>
-    </p:extLst>
-  </p:cSld>
-  <p:clrMapOvr>
-    <a:masterClrMapping/>
-  </p:clrMapOvr>
-  <p:timing>
-    <p:tnLst>
-      <p:par>
-        <p:cTn id="1" dur="indefinite" restart="never" nodeType="tmRoot"/>
-      </p:par>
-    </p:tnLst>
-  </p:timing>
-</p:sld>
-</file>
-
-<file path=ppt/slides/slide6.xml><?xml version="1.0" encoding="utf-8"?>
-<p:sld xmlns:a="http://schemas.openxmlformats.org/drawingml/2006/main" xmlns:r="http://schemas.openxmlformats.org/officeDocument/2006/relationships" xmlns:p="http://schemas.openxmlformats.org/presentationml/2006/main">
-  <p:cSld>
-    <p:spTree>
-      <p:nvGrpSpPr>
-        <p:cNvPr id="1" name=""/>
-        <p:cNvGrpSpPr/>
-        <p:nvPr/>
-      </p:nvGrpSpPr>
-      <p:grpSpPr>
-        <a:xfrm>
-          <a:off x="0" y="0"/>
-          <a:ext cx="0" cy="0"/>
-          <a:chOff x="0" y="0"/>
-          <a:chExt cx="0" cy="0"/>
-        </a:xfrm>
-      </p:grpSpPr>
-      <p:pic>
-        <p:nvPicPr>
-          <p:cNvPr id="10" name="Zástupný symbol pro obsah 9"/>
-          <p:cNvPicPr>
-            <a:picLocks noGrp="1" noChangeAspect="1"/>
-          </p:cNvPicPr>
-          <p:nvPr>
-            <p:ph idx="1"/>
-          </p:nvPr>
-        </p:nvPicPr>
-        <p:blipFill>
-          <a:blip r:embed="rId2">
-            <a:extLst>
-              <a:ext uri="{28A0092B-C50C-407E-A947-70E740481C1C}">
-                <a14:useLocalDpi xmlns:a14="http://schemas.microsoft.com/office/drawing/2010/main" val="0"/>
-              </a:ext>
-            </a:extLst>
-          </a:blip>
-          <a:stretch>
-            <a:fillRect/>
-          </a:stretch>
-        </p:blipFill>
-        <p:spPr>
-          <a:xfrm>
-            <a:off x="1505526" y="101599"/>
-            <a:ext cx="5828145" cy="6585527"/>
-          </a:xfrm>
-        </p:spPr>
-      </p:pic>
-    </p:spTree>
-    <p:extLst>
-      <p:ext uri="{BB962C8B-B14F-4D97-AF65-F5344CB8AC3E}">
-        <p14:creationId xmlns:p14="http://schemas.microsoft.com/office/powerpoint/2010/main" val="264051406"/>
-      </p:ext>
-    </p:extLst>
-  </p:cSld>
-  <p:clrMapOvr>
-    <a:masterClrMapping/>
-  </p:clrMapOvr>
-  <p:timing>
-    <p:tnLst>
-      <p:par>
-        <p:cTn id="1" dur="indefinite" restart="never" nodeType="tmRoot"/>
-      </p:par>
-    </p:tnLst>
-  </p:timing>
-</p:sld>
-</file>
-
-<file path=ppt/slides/slide7.xml><?xml version="1.0" encoding="utf-8"?>
 <p:sld xmlns:a="http://schemas.openxmlformats.org/drawingml/2006/main" xmlns:r="http://schemas.openxmlformats.org/officeDocument/2006/relationships" xmlns:p="http://schemas.openxmlformats.org/presentationml/2006/main">
   <p:cSld>
     <p:spTree>
@@ -13818,6 +13642,1549 @@
   <p:clrMapOvr>
     <a:masterClrMapping/>
   </p:clrMapOvr>
+  <mc:AlternateContent xmlns:mc="http://schemas.openxmlformats.org/markup-compatibility/2006" xmlns:p14="http://schemas.microsoft.com/office/powerpoint/2010/main">
+    <mc:Choice Requires="p14">
+      <p:transition spd="slow" p14:dur="2000"/>
+    </mc:Choice>
+    <mc:Fallback xmlns="">
+      <p:transition spd="slow"/>
+    </mc:Fallback>
+  </mc:AlternateContent>
+  <p:timing>
+    <p:tnLst>
+      <p:par>
+        <p:cTn id="1" dur="indefinite" restart="never" nodeType="tmRoot"/>
+      </p:par>
+    </p:tnLst>
+  </p:timing>
+</p:sld>
+</file>
+
+<file path=ppt/slides/slide5.xml><?xml version="1.0" encoding="utf-8"?>
+<p:sld xmlns:a="http://schemas.openxmlformats.org/drawingml/2006/main" xmlns:r="http://schemas.openxmlformats.org/officeDocument/2006/relationships" xmlns:p="http://schemas.openxmlformats.org/presentationml/2006/main">
+  <p:cSld>
+    <p:spTree>
+      <p:nvGrpSpPr>
+        <p:cNvPr id="1" name=""/>
+        <p:cNvGrpSpPr/>
+        <p:nvPr/>
+      </p:nvGrpSpPr>
+      <p:grpSpPr>
+        <a:xfrm>
+          <a:off x="0" y="0"/>
+          <a:ext cx="0" cy="0"/>
+          <a:chOff x="0" y="0"/>
+          <a:chExt cx="0" cy="0"/>
+        </a:xfrm>
+      </p:grpSpPr>
+      <p:sp>
+        <p:nvSpPr>
+          <p:cNvPr id="2" name="Nadpis 1"/>
+          <p:cNvSpPr>
+            <a:spLocks noGrp="1"/>
+          </p:cNvSpPr>
+          <p:nvPr>
+            <p:ph type="title"/>
+          </p:nvPr>
+        </p:nvSpPr>
+        <p:spPr/>
+        <p:txBody>
+          <a:bodyPr/>
+          <a:lstStyle/>
+          <a:p>
+            <a:r>
+              <a:rPr lang="cs-CZ" dirty="0" smtClean="0">
+                <a:solidFill>
+                  <a:schemeClr val="tx1"/>
+                </a:solidFill>
+              </a:rPr>
+              <a:t>Implementace</a:t>
+            </a:r>
+            <a:endParaRPr lang="cs-CZ" dirty="0">
+              <a:solidFill>
+                <a:schemeClr val="tx1"/>
+              </a:solidFill>
+            </a:endParaRPr>
+          </a:p>
+        </p:txBody>
+      </p:sp>
+      <p:graphicFrame>
+        <p:nvGraphicFramePr>
+          <p:cNvPr id="4" name="Zástupný symbol pro obsah 3"/>
+          <p:cNvGraphicFramePr>
+            <a:graphicFrameLocks noGrp="1"/>
+          </p:cNvGraphicFramePr>
+          <p:nvPr>
+            <p:ph idx="1"/>
+            <p:extLst>
+              <p:ext uri="{D42A27DB-BD31-4B8C-83A1-F6EECF244321}">
+                <p14:modId xmlns:p14="http://schemas.microsoft.com/office/powerpoint/2010/main" val="2240668816"/>
+              </p:ext>
+            </p:extLst>
+          </p:nvPr>
+        </p:nvGraphicFramePr>
+        <p:xfrm>
+          <a:off x="677334" y="1930400"/>
+          <a:ext cx="8596312" cy="3881437"/>
+        </p:xfrm>
+        <a:graphic>
+          <a:graphicData uri="http://schemas.openxmlformats.org/drawingml/2006/diagram">
+            <dgm:relIds xmlns:dgm="http://schemas.openxmlformats.org/drawingml/2006/diagram" xmlns:r="http://schemas.openxmlformats.org/officeDocument/2006/relationships" r:dm="rId2" r:lo="rId3" r:qs="rId4" r:cs="rId5"/>
+          </a:graphicData>
+        </a:graphic>
+      </p:graphicFrame>
+    </p:spTree>
+    <p:extLst>
+      <p:ext uri="{BB962C8B-B14F-4D97-AF65-F5344CB8AC3E}">
+        <p14:creationId xmlns:p14="http://schemas.microsoft.com/office/powerpoint/2010/main" val="290709890"/>
+      </p:ext>
+    </p:extLst>
+  </p:cSld>
+  <p:clrMapOvr>
+    <a:masterClrMapping/>
+  </p:clrMapOvr>
+  <p:timing>
+    <p:tnLst>
+      <p:par>
+        <p:cTn id="1" dur="indefinite" restart="never" nodeType="tmRoot"/>
+      </p:par>
+    </p:tnLst>
+  </p:timing>
+</p:sld>
+</file>
+
+<file path=ppt/slides/slide6.xml><?xml version="1.0" encoding="utf-8"?>
+<p:sld xmlns:a="http://schemas.openxmlformats.org/drawingml/2006/main" xmlns:r="http://schemas.openxmlformats.org/officeDocument/2006/relationships" xmlns:p="http://schemas.openxmlformats.org/presentationml/2006/main">
+  <p:cSld>
+    <p:spTree>
+      <p:nvGrpSpPr>
+        <p:cNvPr id="1" name=""/>
+        <p:cNvGrpSpPr/>
+        <p:nvPr/>
+      </p:nvGrpSpPr>
+      <p:grpSpPr>
+        <a:xfrm>
+          <a:off x="0" y="0"/>
+          <a:ext cx="0" cy="0"/>
+          <a:chOff x="0" y="0"/>
+          <a:chExt cx="0" cy="0"/>
+        </a:xfrm>
+      </p:grpSpPr>
+      <p:sp>
+        <p:nvSpPr>
+          <p:cNvPr id="2" name="Obdélník 1"/>
+          <p:cNvSpPr/>
+          <p:nvPr/>
+        </p:nvSpPr>
+        <p:spPr>
+          <a:xfrm>
+            <a:off x="3661064" y="534040"/>
+            <a:ext cx="2447549" cy="800614"/>
+          </a:xfrm>
+          <a:prstGeom prst="rect">
+            <a:avLst/>
+          </a:prstGeom>
+          <a:effectLst>
+            <a:outerShdw blurRad="50800" dist="38100" dir="2700000" algn="tl" rotWithShape="0">
+              <a:prstClr val="black">
+                <a:alpha val="40000"/>
+              </a:prstClr>
+            </a:outerShdw>
+          </a:effectLst>
+        </p:spPr>
+        <p:style>
+          <a:lnRef idx="2">
+            <a:schemeClr val="accent2"/>
+          </a:lnRef>
+          <a:fillRef idx="1">
+            <a:schemeClr val="lt1"/>
+          </a:fillRef>
+          <a:effectRef idx="0">
+            <a:schemeClr val="accent2"/>
+          </a:effectRef>
+          <a:fontRef idx="minor">
+            <a:schemeClr val="dk1"/>
+          </a:fontRef>
+        </p:style>
+        <p:txBody>
+          <a:bodyPr rtlCol="0" anchor="ctr"/>
+          <a:lstStyle/>
+          <a:p>
+            <a:pPr algn="ctr"/>
+            <a:r>
+              <a:rPr lang="cs-CZ" sz="2400" dirty="0" smtClean="0"/>
+              <a:t>První snímek</a:t>
+            </a:r>
+            <a:endParaRPr lang="cs-CZ" sz="2400" dirty="0"/>
+          </a:p>
+        </p:txBody>
+      </p:sp>
+      <p:sp>
+        <p:nvSpPr>
+          <p:cNvPr id="4" name="Obdélník 3"/>
+          <p:cNvSpPr/>
+          <p:nvPr/>
+        </p:nvSpPr>
+        <p:spPr>
+          <a:xfrm>
+            <a:off x="6904181" y="534039"/>
+            <a:ext cx="2447552" cy="800614"/>
+          </a:xfrm>
+          <a:prstGeom prst="rect">
+            <a:avLst/>
+          </a:prstGeom>
+          <a:effectLst>
+            <a:outerShdw blurRad="50800" dist="38100" dir="2700000" algn="tl" rotWithShape="0">
+              <a:prstClr val="black">
+                <a:alpha val="40000"/>
+              </a:prstClr>
+            </a:outerShdw>
+          </a:effectLst>
+        </p:spPr>
+        <p:style>
+          <a:lnRef idx="2">
+            <a:schemeClr val="accent2"/>
+          </a:lnRef>
+          <a:fillRef idx="1">
+            <a:schemeClr val="lt1"/>
+          </a:fillRef>
+          <a:effectRef idx="0">
+            <a:schemeClr val="accent2"/>
+          </a:effectRef>
+          <a:fontRef idx="minor">
+            <a:schemeClr val="dk1"/>
+          </a:fontRef>
+        </p:style>
+        <p:txBody>
+          <a:bodyPr rtlCol="0" anchor="ctr"/>
+          <a:lstStyle/>
+          <a:p>
+            <a:pPr algn="ctr"/>
+            <a:r>
+              <a:rPr lang="cs-CZ" sz="2400" dirty="0" smtClean="0"/>
+              <a:t>Druhý snímek</a:t>
+            </a:r>
+            <a:endParaRPr lang="cs-CZ" sz="2400" dirty="0"/>
+          </a:p>
+        </p:txBody>
+      </p:sp>
+      <p:sp>
+        <p:nvSpPr>
+          <p:cNvPr id="5" name="Obdélník 4"/>
+          <p:cNvSpPr/>
+          <p:nvPr/>
+        </p:nvSpPr>
+        <p:spPr>
+          <a:xfrm>
+            <a:off x="5176983" y="2317068"/>
+            <a:ext cx="3022252" cy="924896"/>
+          </a:xfrm>
+          <a:prstGeom prst="rect">
+            <a:avLst/>
+          </a:prstGeom>
+          <a:effectLst>
+            <a:outerShdw blurRad="50800" dist="38100" dir="2700000" algn="tl" rotWithShape="0">
+              <a:prstClr val="black">
+                <a:alpha val="40000"/>
+              </a:prstClr>
+            </a:outerShdw>
+          </a:effectLst>
+        </p:spPr>
+        <p:style>
+          <a:lnRef idx="2">
+            <a:schemeClr val="accent2"/>
+          </a:lnRef>
+          <a:fillRef idx="1">
+            <a:schemeClr val="lt1"/>
+          </a:fillRef>
+          <a:effectRef idx="0">
+            <a:schemeClr val="accent2"/>
+          </a:effectRef>
+          <a:fontRef idx="minor">
+            <a:schemeClr val="dk1"/>
+          </a:fontRef>
+        </p:style>
+        <p:txBody>
+          <a:bodyPr rtlCol="0" anchor="ctr"/>
+          <a:lstStyle/>
+          <a:p>
+            <a:pPr algn="ctr"/>
+            <a:r>
+              <a:rPr lang="cs-CZ" sz="2400" dirty="0" smtClean="0"/>
+              <a:t>Odhad struktury</a:t>
+            </a:r>
+            <a:endParaRPr lang="cs-CZ" sz="2400" dirty="0"/>
+          </a:p>
+        </p:txBody>
+      </p:sp>
+      <p:sp>
+        <p:nvSpPr>
+          <p:cNvPr id="6" name="Obdélník 5"/>
+          <p:cNvSpPr/>
+          <p:nvPr/>
+        </p:nvSpPr>
+        <p:spPr>
+          <a:xfrm>
+            <a:off x="1149927" y="2115128"/>
+            <a:ext cx="2914073" cy="895928"/>
+          </a:xfrm>
+          <a:prstGeom prst="rect">
+            <a:avLst/>
+          </a:prstGeom>
+          <a:effectLst>
+            <a:outerShdw blurRad="50800" dist="38100" dir="2700000" algn="tl" rotWithShape="0">
+              <a:prstClr val="black">
+                <a:alpha val="40000"/>
+              </a:prstClr>
+            </a:outerShdw>
+          </a:effectLst>
+        </p:spPr>
+        <p:style>
+          <a:lnRef idx="2">
+            <a:schemeClr val="accent2"/>
+          </a:lnRef>
+          <a:fillRef idx="1">
+            <a:schemeClr val="lt1"/>
+          </a:fillRef>
+          <a:effectRef idx="0">
+            <a:schemeClr val="accent2"/>
+          </a:effectRef>
+          <a:fontRef idx="minor">
+            <a:schemeClr val="dk1"/>
+          </a:fontRef>
+        </p:style>
+        <p:txBody>
+          <a:bodyPr rtlCol="0" anchor="ctr"/>
+          <a:lstStyle/>
+          <a:p>
+            <a:pPr algn="ctr"/>
+            <a:r>
+              <a:rPr lang="cs-CZ" sz="2400" dirty="0" smtClean="0"/>
+              <a:t>Referenční snímek</a:t>
+            </a:r>
+            <a:endParaRPr lang="cs-CZ" sz="2400" dirty="0"/>
+          </a:p>
+        </p:txBody>
+      </p:sp>
+      <p:sp>
+        <p:nvSpPr>
+          <p:cNvPr id="7" name="Obdélník 6"/>
+          <p:cNvSpPr/>
+          <p:nvPr/>
+        </p:nvSpPr>
+        <p:spPr>
+          <a:xfrm>
+            <a:off x="1149926" y="3500454"/>
+            <a:ext cx="2914074" cy="1099256"/>
+          </a:xfrm>
+          <a:prstGeom prst="rect">
+            <a:avLst/>
+          </a:prstGeom>
+          <a:effectLst>
+            <a:outerShdw blurRad="50800" dist="38100" dir="2700000" algn="tl" rotWithShape="0">
+              <a:prstClr val="black">
+                <a:alpha val="40000"/>
+              </a:prstClr>
+            </a:outerShdw>
+          </a:effectLst>
+        </p:spPr>
+        <p:style>
+          <a:lnRef idx="2">
+            <a:schemeClr val="accent2"/>
+          </a:lnRef>
+          <a:fillRef idx="1">
+            <a:schemeClr val="lt1"/>
+          </a:fillRef>
+          <a:effectRef idx="0">
+            <a:schemeClr val="accent2"/>
+          </a:effectRef>
+          <a:fontRef idx="minor">
+            <a:schemeClr val="dk1"/>
+          </a:fontRef>
+        </p:style>
+        <p:txBody>
+          <a:bodyPr rtlCol="0" anchor="ctr"/>
+          <a:lstStyle/>
+          <a:p>
+            <a:pPr algn="ctr"/>
+            <a:r>
+              <a:rPr lang="cs-CZ" sz="2400" dirty="0" smtClean="0"/>
+              <a:t>Ohnisková vzdálenost</a:t>
+            </a:r>
+            <a:endParaRPr lang="cs-CZ" sz="2400" dirty="0"/>
+          </a:p>
+        </p:txBody>
+      </p:sp>
+      <p:sp>
+        <p:nvSpPr>
+          <p:cNvPr id="8" name="Obdélník 7"/>
+          <p:cNvSpPr/>
+          <p:nvPr/>
+        </p:nvSpPr>
+        <p:spPr>
+          <a:xfrm>
+            <a:off x="1149927" y="5113934"/>
+            <a:ext cx="2914073" cy="843459"/>
+          </a:xfrm>
+          <a:prstGeom prst="rect">
+            <a:avLst/>
+          </a:prstGeom>
+          <a:effectLst>
+            <a:outerShdw blurRad="50800" dist="38100" dir="2700000" algn="tl" rotWithShape="0">
+              <a:prstClr val="black">
+                <a:alpha val="40000"/>
+              </a:prstClr>
+            </a:outerShdw>
+          </a:effectLst>
+        </p:spPr>
+        <p:style>
+          <a:lnRef idx="2">
+            <a:schemeClr val="accent2"/>
+          </a:lnRef>
+          <a:fillRef idx="1">
+            <a:schemeClr val="lt1"/>
+          </a:fillRef>
+          <a:effectRef idx="0">
+            <a:schemeClr val="accent2"/>
+          </a:effectRef>
+          <a:fontRef idx="minor">
+            <a:schemeClr val="dk1"/>
+          </a:fontRef>
+        </p:style>
+        <p:txBody>
+          <a:bodyPr rtlCol="0" anchor="ctr"/>
+          <a:lstStyle/>
+          <a:p>
+            <a:pPr algn="ctr"/>
+            <a:r>
+              <a:rPr lang="cs-CZ" sz="2400" dirty="0" smtClean="0"/>
+              <a:t>Kalibrace</a:t>
+            </a:r>
+            <a:endParaRPr lang="cs-CZ" sz="2400" dirty="0"/>
+          </a:p>
+        </p:txBody>
+      </p:sp>
+      <p:cxnSp>
+        <p:nvCxnSpPr>
+          <p:cNvPr id="10" name="Přímá spojnice se šipkou 9"/>
+          <p:cNvCxnSpPr>
+            <a:stCxn id="2" idx="2"/>
+            <a:endCxn id="5" idx="0"/>
+          </p:cNvCxnSpPr>
+          <p:nvPr/>
+        </p:nvCxnSpPr>
+        <p:spPr>
+          <a:xfrm rot="16200000" flipH="1">
+            <a:off x="5295267" y="924226"/>
+            <a:ext cx="982414" cy="1803270"/>
+          </a:xfrm>
+          <a:prstGeom prst="bentConnector3">
+            <a:avLst>
+              <a:gd name="adj1" fmla="val 50000"/>
+            </a:avLst>
+          </a:prstGeom>
+          <a:ln>
+            <a:tailEnd type="triangle"/>
+          </a:ln>
+          <a:effectLst>
+            <a:outerShdw blurRad="50800" dist="38100" dir="2700000" algn="tl" rotWithShape="0">
+              <a:prstClr val="black">
+                <a:alpha val="40000"/>
+              </a:prstClr>
+            </a:outerShdw>
+          </a:effectLst>
+        </p:spPr>
+        <p:style>
+          <a:lnRef idx="2">
+            <a:schemeClr val="accent2"/>
+          </a:lnRef>
+          <a:fillRef idx="1">
+            <a:schemeClr val="lt1"/>
+          </a:fillRef>
+          <a:effectRef idx="0">
+            <a:schemeClr val="accent2"/>
+          </a:effectRef>
+          <a:fontRef idx="minor">
+            <a:schemeClr val="dk1"/>
+          </a:fontRef>
+        </p:style>
+      </p:cxnSp>
+      <p:cxnSp>
+        <p:nvCxnSpPr>
+          <p:cNvPr id="14" name="Přímá spojnice se šipkou 13"/>
+          <p:cNvCxnSpPr>
+            <a:stCxn id="4" idx="2"/>
+            <a:endCxn id="5" idx="0"/>
+          </p:cNvCxnSpPr>
+          <p:nvPr/>
+        </p:nvCxnSpPr>
+        <p:spPr>
+          <a:xfrm rot="5400000">
+            <a:off x="6916826" y="1105936"/>
+            <a:ext cx="982415" cy="1439848"/>
+          </a:xfrm>
+          <a:prstGeom prst="bentConnector3">
+            <a:avLst>
+              <a:gd name="adj1" fmla="val 50000"/>
+            </a:avLst>
+          </a:prstGeom>
+          <a:ln>
+            <a:tailEnd type="triangle"/>
+          </a:ln>
+          <a:effectLst>
+            <a:outerShdw blurRad="50800" dist="38100" dir="2700000" algn="tl" rotWithShape="0">
+              <a:prstClr val="black">
+                <a:alpha val="40000"/>
+              </a:prstClr>
+            </a:outerShdw>
+          </a:effectLst>
+        </p:spPr>
+        <p:style>
+          <a:lnRef idx="2">
+            <a:schemeClr val="accent2"/>
+          </a:lnRef>
+          <a:fillRef idx="1">
+            <a:schemeClr val="lt1"/>
+          </a:fillRef>
+          <a:effectRef idx="0">
+            <a:schemeClr val="accent2"/>
+          </a:effectRef>
+          <a:fontRef idx="minor">
+            <a:schemeClr val="dk1"/>
+          </a:fontRef>
+        </p:style>
+      </p:cxnSp>
+      <p:cxnSp>
+        <p:nvCxnSpPr>
+          <p:cNvPr id="19" name="Pravoúhlá spojnice 18"/>
+          <p:cNvCxnSpPr>
+            <a:stCxn id="6" idx="2"/>
+            <a:endCxn id="7" idx="0"/>
+          </p:cNvCxnSpPr>
+          <p:nvPr/>
+        </p:nvCxnSpPr>
+        <p:spPr>
+          <a:xfrm rot="5400000">
+            <a:off x="2362265" y="3255755"/>
+            <a:ext cx="489398" cy="1"/>
+          </a:xfrm>
+          <a:prstGeom prst="bentConnector3">
+            <a:avLst/>
+          </a:prstGeom>
+          <a:ln>
+            <a:tailEnd type="triangle"/>
+          </a:ln>
+          <a:effectLst>
+            <a:outerShdw blurRad="50800" dist="38100" dir="2700000" algn="tl" rotWithShape="0">
+              <a:prstClr val="black">
+                <a:alpha val="40000"/>
+              </a:prstClr>
+            </a:outerShdw>
+          </a:effectLst>
+        </p:spPr>
+        <p:style>
+          <a:lnRef idx="2">
+            <a:schemeClr val="accent2"/>
+          </a:lnRef>
+          <a:fillRef idx="1">
+            <a:schemeClr val="lt1"/>
+          </a:fillRef>
+          <a:effectRef idx="0">
+            <a:schemeClr val="accent2"/>
+          </a:effectRef>
+          <a:fontRef idx="minor">
+            <a:schemeClr val="dk1"/>
+          </a:fontRef>
+        </p:style>
+      </p:cxnSp>
+      <p:cxnSp>
+        <p:nvCxnSpPr>
+          <p:cNvPr id="21" name="Pravoúhlá spojnice 20"/>
+          <p:cNvCxnSpPr>
+            <a:stCxn id="5" idx="2"/>
+            <a:endCxn id="7" idx="3"/>
+          </p:cNvCxnSpPr>
+          <p:nvPr/>
+        </p:nvCxnSpPr>
+        <p:spPr>
+          <a:xfrm rot="5400000">
+            <a:off x="4971996" y="2333969"/>
+            <a:ext cx="808118" cy="2624109"/>
+          </a:xfrm>
+          <a:prstGeom prst="bentConnector2">
+            <a:avLst/>
+          </a:prstGeom>
+          <a:ln>
+            <a:tailEnd type="triangle"/>
+          </a:ln>
+          <a:effectLst>
+            <a:outerShdw blurRad="50800" dist="38100" dir="2700000" algn="tl" rotWithShape="0">
+              <a:prstClr val="black">
+                <a:alpha val="40000"/>
+              </a:prstClr>
+            </a:outerShdw>
+          </a:effectLst>
+        </p:spPr>
+        <p:style>
+          <a:lnRef idx="2">
+            <a:schemeClr val="accent2"/>
+          </a:lnRef>
+          <a:fillRef idx="1">
+            <a:schemeClr val="lt1"/>
+          </a:fillRef>
+          <a:effectRef idx="0">
+            <a:schemeClr val="accent2"/>
+          </a:effectRef>
+          <a:fontRef idx="minor">
+            <a:schemeClr val="dk1"/>
+          </a:fontRef>
+        </p:style>
+      </p:cxnSp>
+      <p:cxnSp>
+        <p:nvCxnSpPr>
+          <p:cNvPr id="24" name="Přímá spojnice se šipkou 23"/>
+          <p:cNvCxnSpPr>
+            <a:stCxn id="7" idx="2"/>
+            <a:endCxn id="8" idx="0"/>
+          </p:cNvCxnSpPr>
+          <p:nvPr/>
+        </p:nvCxnSpPr>
+        <p:spPr>
+          <a:xfrm>
+            <a:off x="2606963" y="4599710"/>
+            <a:ext cx="1" cy="514224"/>
+          </a:xfrm>
+          <a:prstGeom prst="straightConnector1">
+            <a:avLst/>
+          </a:prstGeom>
+          <a:ln>
+            <a:tailEnd type="triangle"/>
+          </a:ln>
+          <a:effectLst>
+            <a:outerShdw blurRad="50800" dist="38100" dir="2700000" algn="tl" rotWithShape="0">
+              <a:prstClr val="black">
+                <a:alpha val="40000"/>
+              </a:prstClr>
+            </a:outerShdw>
+          </a:effectLst>
+        </p:spPr>
+        <p:style>
+          <a:lnRef idx="2">
+            <a:schemeClr val="accent2"/>
+          </a:lnRef>
+          <a:fillRef idx="1">
+            <a:schemeClr val="lt1"/>
+          </a:fillRef>
+          <a:effectRef idx="0">
+            <a:schemeClr val="accent2"/>
+          </a:effectRef>
+          <a:fontRef idx="minor">
+            <a:schemeClr val="dk1"/>
+          </a:fontRef>
+        </p:style>
+      </p:cxnSp>
+    </p:spTree>
+    <p:extLst>
+      <p:ext uri="{BB962C8B-B14F-4D97-AF65-F5344CB8AC3E}">
+        <p14:creationId xmlns:p14="http://schemas.microsoft.com/office/powerpoint/2010/main" val="2966733355"/>
+      </p:ext>
+    </p:extLst>
+  </p:cSld>
+  <p:clrMapOvr>
+    <a:masterClrMapping/>
+  </p:clrMapOvr>
+  <p:timing>
+    <p:tnLst>
+      <p:par>
+        <p:cTn id="1" dur="indefinite" restart="never" nodeType="tmRoot"/>
+      </p:par>
+    </p:tnLst>
+  </p:timing>
+</p:sld>
+</file>
+
+<file path=ppt/slides/slide7.xml><?xml version="1.0" encoding="utf-8"?>
+<p:sld xmlns:a="http://schemas.openxmlformats.org/drawingml/2006/main" xmlns:r="http://schemas.openxmlformats.org/officeDocument/2006/relationships" xmlns:p="http://schemas.openxmlformats.org/presentationml/2006/main">
+  <p:cSld>
+    <p:spTree>
+      <p:nvGrpSpPr>
+        <p:cNvPr id="1" name=""/>
+        <p:cNvGrpSpPr/>
+        <p:nvPr/>
+      </p:nvGrpSpPr>
+      <p:grpSpPr>
+        <a:xfrm>
+          <a:off x="0" y="0"/>
+          <a:ext cx="0" cy="0"/>
+          <a:chOff x="0" y="0"/>
+          <a:chExt cx="0" cy="0"/>
+        </a:xfrm>
+      </p:grpSpPr>
+      <p:sp>
+        <p:nvSpPr>
+          <p:cNvPr id="8" name="Obdélník 7"/>
+          <p:cNvSpPr/>
+          <p:nvPr/>
+        </p:nvSpPr>
+        <p:spPr>
+          <a:xfrm>
+            <a:off x="735708" y="2395681"/>
+            <a:ext cx="2161309" cy="900550"/>
+          </a:xfrm>
+          <a:prstGeom prst="rect">
+            <a:avLst/>
+          </a:prstGeom>
+          <a:effectLst>
+            <a:outerShdw blurRad="50800" dist="38100" dir="2700000" algn="tl" rotWithShape="0">
+              <a:prstClr val="black">
+                <a:alpha val="40000"/>
+              </a:prstClr>
+            </a:outerShdw>
+          </a:effectLst>
+        </p:spPr>
+        <p:style>
+          <a:lnRef idx="2">
+            <a:schemeClr val="accent2"/>
+          </a:lnRef>
+          <a:fillRef idx="1">
+            <a:schemeClr val="lt1"/>
+          </a:fillRef>
+          <a:effectRef idx="0">
+            <a:schemeClr val="accent2"/>
+          </a:effectRef>
+          <a:fontRef idx="minor">
+            <a:schemeClr val="dk1"/>
+          </a:fontRef>
+        </p:style>
+        <p:txBody>
+          <a:bodyPr rtlCol="0" anchor="ctr"/>
+          <a:lstStyle/>
+          <a:p>
+            <a:pPr algn="ctr"/>
+            <a:r>
+              <a:rPr lang="cs-CZ" sz="2400" dirty="0" smtClean="0"/>
+              <a:t>První snímek</a:t>
+            </a:r>
+            <a:endParaRPr lang="cs-CZ" sz="2400" dirty="0"/>
+          </a:p>
+        </p:txBody>
+      </p:sp>
+      <p:sp>
+        <p:nvSpPr>
+          <p:cNvPr id="9" name="Obdélník 8"/>
+          <p:cNvSpPr/>
+          <p:nvPr/>
+        </p:nvSpPr>
+        <p:spPr>
+          <a:xfrm>
+            <a:off x="3524732" y="2395681"/>
+            <a:ext cx="2474321" cy="900550"/>
+          </a:xfrm>
+          <a:prstGeom prst="rect">
+            <a:avLst/>
+          </a:prstGeom>
+          <a:effectLst>
+            <a:outerShdw blurRad="50800" dist="38100" dir="2700000" algn="tl" rotWithShape="0">
+              <a:prstClr val="black">
+                <a:alpha val="40000"/>
+              </a:prstClr>
+            </a:outerShdw>
+          </a:effectLst>
+        </p:spPr>
+        <p:style>
+          <a:lnRef idx="2">
+            <a:schemeClr val="accent2"/>
+          </a:lnRef>
+          <a:fillRef idx="1">
+            <a:schemeClr val="lt1"/>
+          </a:fillRef>
+          <a:effectRef idx="0">
+            <a:schemeClr val="accent2"/>
+          </a:effectRef>
+          <a:fontRef idx="minor">
+            <a:schemeClr val="dk1"/>
+          </a:fontRef>
+        </p:style>
+        <p:txBody>
+          <a:bodyPr rtlCol="0" anchor="ctr"/>
+          <a:lstStyle/>
+          <a:p>
+            <a:pPr algn="ctr"/>
+            <a:r>
+              <a:rPr lang="cs-CZ" sz="2400" dirty="0" smtClean="0"/>
+              <a:t>Aktuální snímek</a:t>
+            </a:r>
+            <a:endParaRPr lang="cs-CZ" sz="2400" dirty="0"/>
+          </a:p>
+        </p:txBody>
+      </p:sp>
+      <p:sp>
+        <p:nvSpPr>
+          <p:cNvPr id="10" name="Obdélník 9"/>
+          <p:cNvSpPr/>
+          <p:nvPr/>
+        </p:nvSpPr>
+        <p:spPr>
+          <a:xfrm>
+            <a:off x="2032000" y="4012040"/>
+            <a:ext cx="2369727" cy="900550"/>
+          </a:xfrm>
+          <a:prstGeom prst="rect">
+            <a:avLst/>
+          </a:prstGeom>
+          <a:effectLst>
+            <a:outerShdw blurRad="50800" dist="38100" dir="2700000" algn="tl" rotWithShape="0">
+              <a:prstClr val="black">
+                <a:alpha val="40000"/>
+              </a:prstClr>
+            </a:outerShdw>
+          </a:effectLst>
+        </p:spPr>
+        <p:style>
+          <a:lnRef idx="2">
+            <a:schemeClr val="accent2"/>
+          </a:lnRef>
+          <a:fillRef idx="1">
+            <a:schemeClr val="lt1"/>
+          </a:fillRef>
+          <a:effectRef idx="0">
+            <a:schemeClr val="accent2"/>
+          </a:effectRef>
+          <a:fontRef idx="minor">
+            <a:schemeClr val="dk1"/>
+          </a:fontRef>
+        </p:style>
+        <p:txBody>
+          <a:bodyPr rtlCol="0" anchor="ctr"/>
+          <a:lstStyle/>
+          <a:p>
+            <a:pPr algn="ctr"/>
+            <a:r>
+              <a:rPr lang="cs-CZ" sz="2400" dirty="0" smtClean="0"/>
+              <a:t>SIFT, </a:t>
+            </a:r>
+            <a:r>
+              <a:rPr lang="cs-CZ" sz="2400" dirty="0" err="1" smtClean="0"/>
+              <a:t>Matcher</a:t>
+            </a:r>
+            <a:endParaRPr lang="cs-CZ" sz="2400" dirty="0"/>
+          </a:p>
+        </p:txBody>
+      </p:sp>
+      <p:sp>
+        <p:nvSpPr>
+          <p:cNvPr id="11" name="Obdélník 10"/>
+          <p:cNvSpPr/>
+          <p:nvPr/>
+        </p:nvSpPr>
+        <p:spPr>
+          <a:xfrm>
+            <a:off x="2190794" y="5385947"/>
+            <a:ext cx="2052137" cy="900550"/>
+          </a:xfrm>
+          <a:prstGeom prst="rect">
+            <a:avLst/>
+          </a:prstGeom>
+          <a:effectLst>
+            <a:outerShdw blurRad="50800" dist="38100" dir="2700000" algn="tl" rotWithShape="0">
+              <a:prstClr val="black">
+                <a:alpha val="40000"/>
+              </a:prstClr>
+            </a:outerShdw>
+          </a:effectLst>
+        </p:spPr>
+        <p:style>
+          <a:lnRef idx="2">
+            <a:schemeClr val="accent2"/>
+          </a:lnRef>
+          <a:fillRef idx="1">
+            <a:schemeClr val="lt1"/>
+          </a:fillRef>
+          <a:effectRef idx="0">
+            <a:schemeClr val="accent2"/>
+          </a:effectRef>
+          <a:fontRef idx="minor">
+            <a:schemeClr val="dk1"/>
+          </a:fontRef>
+        </p:style>
+        <p:txBody>
+          <a:bodyPr rtlCol="0" anchor="ctr"/>
+          <a:lstStyle/>
+          <a:p>
+            <a:pPr algn="ctr"/>
+            <a:r>
+              <a:rPr lang="cs-CZ" sz="2400" dirty="0" smtClean="0"/>
+              <a:t>RANSAC</a:t>
+            </a:r>
+            <a:endParaRPr lang="cs-CZ" sz="2400" dirty="0"/>
+          </a:p>
+        </p:txBody>
+      </p:sp>
+      <p:sp>
+        <p:nvSpPr>
+          <p:cNvPr id="13" name="Obdélník 12"/>
+          <p:cNvSpPr/>
+          <p:nvPr/>
+        </p:nvSpPr>
+        <p:spPr>
+          <a:xfrm>
+            <a:off x="231600" y="630372"/>
+            <a:ext cx="3175924" cy="870533"/>
+          </a:xfrm>
+          <a:prstGeom prst="rect">
+            <a:avLst/>
+          </a:prstGeom>
+          <a:effectLst>
+            <a:outerShdw blurRad="50800" dist="38100" dir="2700000" algn="tl" rotWithShape="0">
+              <a:prstClr val="black">
+                <a:alpha val="40000"/>
+              </a:prstClr>
+            </a:outerShdw>
+          </a:effectLst>
+        </p:spPr>
+        <p:style>
+          <a:lnRef idx="2">
+            <a:schemeClr val="accent2"/>
+          </a:lnRef>
+          <a:fillRef idx="1">
+            <a:schemeClr val="lt1"/>
+          </a:fillRef>
+          <a:effectRef idx="0">
+            <a:schemeClr val="accent2"/>
+          </a:effectRef>
+          <a:fontRef idx="minor">
+            <a:schemeClr val="dk1"/>
+          </a:fontRef>
+        </p:style>
+        <p:txBody>
+          <a:bodyPr rtlCol="0" anchor="ctr"/>
+          <a:lstStyle/>
+          <a:p>
+            <a:pPr algn="ctr"/>
+            <a:r>
+              <a:rPr lang="cs-CZ" sz="2400" dirty="0" smtClean="0"/>
+              <a:t>Referenční snímek</a:t>
+            </a:r>
+            <a:endParaRPr lang="cs-CZ" sz="2400" dirty="0"/>
+          </a:p>
+        </p:txBody>
+      </p:sp>
+      <p:sp>
+        <p:nvSpPr>
+          <p:cNvPr id="14" name="Obdélník 13"/>
+          <p:cNvSpPr/>
+          <p:nvPr/>
+        </p:nvSpPr>
+        <p:spPr>
+          <a:xfrm>
+            <a:off x="6156035" y="2401454"/>
+            <a:ext cx="3133172" cy="900550"/>
+          </a:xfrm>
+          <a:prstGeom prst="rect">
+            <a:avLst/>
+          </a:prstGeom>
+          <a:effectLst>
+            <a:outerShdw blurRad="50800" dist="38100" dir="2700000" algn="tl" rotWithShape="0">
+              <a:prstClr val="black">
+                <a:alpha val="40000"/>
+              </a:prstClr>
+            </a:outerShdw>
+          </a:effectLst>
+        </p:spPr>
+        <p:style>
+          <a:lnRef idx="2">
+            <a:schemeClr val="accent2"/>
+          </a:lnRef>
+          <a:fillRef idx="1">
+            <a:schemeClr val="lt1"/>
+          </a:fillRef>
+          <a:effectRef idx="0">
+            <a:schemeClr val="accent2"/>
+          </a:effectRef>
+          <a:fontRef idx="minor">
+            <a:schemeClr val="dk1"/>
+          </a:fontRef>
+        </p:style>
+        <p:txBody>
+          <a:bodyPr rtlCol="0" anchor="ctr"/>
+          <a:lstStyle/>
+          <a:p>
+            <a:pPr algn="ctr"/>
+            <a:r>
+              <a:rPr lang="cs-CZ" sz="2400" dirty="0" smtClean="0"/>
+              <a:t>5-points </a:t>
+            </a:r>
+            <a:r>
+              <a:rPr lang="cs-CZ" sz="2400" dirty="0" err="1" smtClean="0"/>
+              <a:t>algorithm</a:t>
+            </a:r>
+            <a:endParaRPr lang="cs-CZ" sz="2400" dirty="0"/>
+          </a:p>
+        </p:txBody>
+      </p:sp>
+      <p:sp>
+        <p:nvSpPr>
+          <p:cNvPr id="16" name="Obdélník 15"/>
+          <p:cNvSpPr/>
+          <p:nvPr/>
+        </p:nvSpPr>
+        <p:spPr>
+          <a:xfrm>
+            <a:off x="6696552" y="4012040"/>
+            <a:ext cx="2052137" cy="900550"/>
+          </a:xfrm>
+          <a:prstGeom prst="rect">
+            <a:avLst/>
+          </a:prstGeom>
+          <a:effectLst>
+            <a:outerShdw blurRad="50800" dist="38100" dir="2700000" algn="tl" rotWithShape="0">
+              <a:prstClr val="black">
+                <a:alpha val="40000"/>
+              </a:prstClr>
+            </a:outerShdw>
+          </a:effectLst>
+        </p:spPr>
+        <p:style>
+          <a:lnRef idx="2">
+            <a:schemeClr val="accent2"/>
+          </a:lnRef>
+          <a:fillRef idx="1">
+            <a:schemeClr val="lt1"/>
+          </a:fillRef>
+          <a:effectRef idx="0">
+            <a:schemeClr val="accent2"/>
+          </a:effectRef>
+          <a:fontRef idx="minor">
+            <a:schemeClr val="dk1"/>
+          </a:fontRef>
+        </p:style>
+        <p:txBody>
+          <a:bodyPr rtlCol="0" anchor="ctr"/>
+          <a:lstStyle/>
+          <a:p>
+            <a:pPr algn="ctr"/>
+            <a:r>
+              <a:rPr lang="cs-CZ" sz="2400" dirty="0" smtClean="0"/>
+              <a:t>KLT </a:t>
+            </a:r>
+            <a:r>
+              <a:rPr lang="cs-CZ" sz="2400" dirty="0" err="1" smtClean="0"/>
+              <a:t>tracker</a:t>
+            </a:r>
+            <a:endParaRPr lang="cs-CZ" sz="2400" dirty="0"/>
+          </a:p>
+        </p:txBody>
+      </p:sp>
+      <p:cxnSp>
+        <p:nvCxnSpPr>
+          <p:cNvPr id="18" name="Přímá spojnice se šipkou 17"/>
+          <p:cNvCxnSpPr>
+            <a:stCxn id="10" idx="2"/>
+            <a:endCxn id="11" idx="0"/>
+          </p:cNvCxnSpPr>
+          <p:nvPr/>
+        </p:nvCxnSpPr>
+        <p:spPr>
+          <a:xfrm flipH="1">
+            <a:off x="3216863" y="4912590"/>
+            <a:ext cx="1" cy="473357"/>
+          </a:xfrm>
+          <a:prstGeom prst="straightConnector1">
+            <a:avLst/>
+          </a:prstGeom>
+          <a:ln>
+            <a:tailEnd type="triangle"/>
+          </a:ln>
+          <a:effectLst>
+            <a:outerShdw blurRad="50800" dist="38100" dir="2700000" algn="tl" rotWithShape="0">
+              <a:prstClr val="black">
+                <a:alpha val="40000"/>
+              </a:prstClr>
+            </a:outerShdw>
+          </a:effectLst>
+        </p:spPr>
+        <p:style>
+          <a:lnRef idx="2">
+            <a:schemeClr val="accent2"/>
+          </a:lnRef>
+          <a:fillRef idx="1">
+            <a:schemeClr val="lt1"/>
+          </a:fillRef>
+          <a:effectRef idx="0">
+            <a:schemeClr val="accent2"/>
+          </a:effectRef>
+          <a:fontRef idx="minor">
+            <a:schemeClr val="dk1"/>
+          </a:fontRef>
+        </p:style>
+      </p:cxnSp>
+      <p:cxnSp>
+        <p:nvCxnSpPr>
+          <p:cNvPr id="20" name="Pravoúhlá spojnice 19"/>
+          <p:cNvCxnSpPr>
+            <a:stCxn id="11" idx="3"/>
+            <a:endCxn id="16" idx="2"/>
+          </p:cNvCxnSpPr>
+          <p:nvPr/>
+        </p:nvCxnSpPr>
+        <p:spPr>
+          <a:xfrm flipV="1">
+            <a:off x="4242931" y="4912590"/>
+            <a:ext cx="3479690" cy="923632"/>
+          </a:xfrm>
+          <a:prstGeom prst="bentConnector2">
+            <a:avLst/>
+          </a:prstGeom>
+          <a:ln>
+            <a:tailEnd type="triangle"/>
+          </a:ln>
+          <a:effectLst>
+            <a:outerShdw blurRad="50800" dist="38100" dir="2700000" algn="tl" rotWithShape="0">
+              <a:prstClr val="black">
+                <a:alpha val="40000"/>
+              </a:prstClr>
+            </a:outerShdw>
+          </a:effectLst>
+        </p:spPr>
+        <p:style>
+          <a:lnRef idx="2">
+            <a:schemeClr val="accent2"/>
+          </a:lnRef>
+          <a:fillRef idx="1">
+            <a:schemeClr val="lt1"/>
+          </a:fillRef>
+          <a:effectRef idx="0">
+            <a:schemeClr val="accent2"/>
+          </a:effectRef>
+          <a:fontRef idx="minor">
+            <a:schemeClr val="dk1"/>
+          </a:fontRef>
+        </p:style>
+      </p:cxnSp>
+      <p:cxnSp>
+        <p:nvCxnSpPr>
+          <p:cNvPr id="31" name="Pravoúhlá spojnice 30"/>
+          <p:cNvCxnSpPr>
+            <a:stCxn id="8" idx="2"/>
+            <a:endCxn id="10" idx="0"/>
+          </p:cNvCxnSpPr>
+          <p:nvPr/>
+        </p:nvCxnSpPr>
+        <p:spPr>
+          <a:xfrm rot="16200000" flipH="1">
+            <a:off x="2158709" y="2953884"/>
+            <a:ext cx="715809" cy="1400501"/>
+          </a:xfrm>
+          <a:prstGeom prst="bentConnector3">
+            <a:avLst/>
+          </a:prstGeom>
+          <a:ln>
+            <a:tailEnd type="triangle"/>
+          </a:ln>
+          <a:effectLst>
+            <a:outerShdw blurRad="50800" dist="38100" dir="2700000" algn="tl" rotWithShape="0">
+              <a:prstClr val="black">
+                <a:alpha val="40000"/>
+              </a:prstClr>
+            </a:outerShdw>
+          </a:effectLst>
+        </p:spPr>
+        <p:style>
+          <a:lnRef idx="2">
+            <a:schemeClr val="accent2"/>
+          </a:lnRef>
+          <a:fillRef idx="1">
+            <a:schemeClr val="lt1"/>
+          </a:fillRef>
+          <a:effectRef idx="0">
+            <a:schemeClr val="accent2"/>
+          </a:effectRef>
+          <a:fontRef idx="minor">
+            <a:schemeClr val="dk1"/>
+          </a:fontRef>
+        </p:style>
+      </p:cxnSp>
+      <p:cxnSp>
+        <p:nvCxnSpPr>
+          <p:cNvPr id="33" name="Pravoúhlá spojnice 32"/>
+          <p:cNvCxnSpPr>
+            <a:stCxn id="9" idx="2"/>
+            <a:endCxn id="10" idx="0"/>
+          </p:cNvCxnSpPr>
+          <p:nvPr/>
+        </p:nvCxnSpPr>
+        <p:spPr>
+          <a:xfrm rot="5400000">
+            <a:off x="3631475" y="2881621"/>
+            <a:ext cx="715809" cy="1545029"/>
+          </a:xfrm>
+          <a:prstGeom prst="bentConnector3">
+            <a:avLst/>
+          </a:prstGeom>
+          <a:ln>
+            <a:tailEnd type="triangle"/>
+          </a:ln>
+          <a:effectLst>
+            <a:outerShdw blurRad="50800" dist="38100" dir="2700000" algn="tl" rotWithShape="0">
+              <a:prstClr val="black">
+                <a:alpha val="40000"/>
+              </a:prstClr>
+            </a:outerShdw>
+          </a:effectLst>
+        </p:spPr>
+        <p:style>
+          <a:lnRef idx="2">
+            <a:schemeClr val="accent2"/>
+          </a:lnRef>
+          <a:fillRef idx="1">
+            <a:schemeClr val="lt1"/>
+          </a:fillRef>
+          <a:effectRef idx="0">
+            <a:schemeClr val="accent2"/>
+          </a:effectRef>
+          <a:fontRef idx="minor">
+            <a:schemeClr val="dk1"/>
+          </a:fontRef>
+        </p:style>
+      </p:cxnSp>
+      <p:cxnSp>
+        <p:nvCxnSpPr>
+          <p:cNvPr id="35" name="Pravoúhlá spojnice 34"/>
+          <p:cNvCxnSpPr>
+            <a:stCxn id="13" idx="2"/>
+            <a:endCxn id="8" idx="0"/>
+          </p:cNvCxnSpPr>
+          <p:nvPr/>
+        </p:nvCxnSpPr>
+        <p:spPr>
+          <a:xfrm rot="5400000">
+            <a:off x="1370575" y="1946694"/>
+            <a:ext cx="894776" cy="3199"/>
+          </a:xfrm>
+          <a:prstGeom prst="bentConnector3">
+            <a:avLst>
+              <a:gd name="adj1" fmla="val 50000"/>
+            </a:avLst>
+          </a:prstGeom>
+          <a:ln>
+            <a:tailEnd type="triangle"/>
+          </a:ln>
+          <a:effectLst>
+            <a:outerShdw blurRad="50800" dist="38100" dir="2700000" algn="tl" rotWithShape="0">
+              <a:prstClr val="black">
+                <a:alpha val="40000"/>
+              </a:prstClr>
+            </a:outerShdw>
+          </a:effectLst>
+        </p:spPr>
+        <p:style>
+          <a:lnRef idx="2">
+            <a:schemeClr val="accent2"/>
+          </a:lnRef>
+          <a:fillRef idx="1">
+            <a:schemeClr val="lt1"/>
+          </a:fillRef>
+          <a:effectRef idx="0">
+            <a:schemeClr val="accent2"/>
+          </a:effectRef>
+          <a:fontRef idx="minor">
+            <a:schemeClr val="dk1"/>
+          </a:fontRef>
+        </p:style>
+      </p:cxnSp>
+      <p:cxnSp>
+        <p:nvCxnSpPr>
+          <p:cNvPr id="84" name="Přímá spojnice se šipkou 83"/>
+          <p:cNvCxnSpPr>
+            <a:stCxn id="16" idx="0"/>
+            <a:endCxn id="14" idx="2"/>
+          </p:cNvCxnSpPr>
+          <p:nvPr/>
+        </p:nvCxnSpPr>
+        <p:spPr>
+          <a:xfrm flipV="1">
+            <a:off x="7722621" y="3302004"/>
+            <a:ext cx="0" cy="710036"/>
+          </a:xfrm>
+          <a:prstGeom prst="straightConnector1">
+            <a:avLst/>
+          </a:prstGeom>
+          <a:ln>
+            <a:tailEnd type="triangle"/>
+          </a:ln>
+          <a:effectLst>
+            <a:outerShdw blurRad="50800" dist="38100" dir="2700000" algn="tl" rotWithShape="0">
+              <a:prstClr val="black">
+                <a:alpha val="40000"/>
+              </a:prstClr>
+            </a:outerShdw>
+          </a:effectLst>
+        </p:spPr>
+        <p:style>
+          <a:lnRef idx="2">
+            <a:schemeClr val="accent2"/>
+          </a:lnRef>
+          <a:fillRef idx="1">
+            <a:schemeClr val="lt1"/>
+          </a:fillRef>
+          <a:effectRef idx="0">
+            <a:schemeClr val="accent2"/>
+          </a:effectRef>
+          <a:fontRef idx="minor">
+            <a:schemeClr val="dk1"/>
+          </a:fontRef>
+        </p:style>
+      </p:cxnSp>
+      <p:sp>
+        <p:nvSpPr>
+          <p:cNvPr id="86" name="Obdélník 85"/>
+          <p:cNvSpPr/>
+          <p:nvPr/>
+        </p:nvSpPr>
+        <p:spPr>
+          <a:xfrm>
+            <a:off x="6305669" y="1007336"/>
+            <a:ext cx="2833902" cy="825504"/>
+          </a:xfrm>
+          <a:prstGeom prst="rect">
+            <a:avLst/>
+          </a:prstGeom>
+          <a:effectLst>
+            <a:outerShdw blurRad="50800" dist="38100" dir="2700000" algn="tl" rotWithShape="0">
+              <a:prstClr val="black">
+                <a:alpha val="40000"/>
+              </a:prstClr>
+            </a:outerShdw>
+          </a:effectLst>
+        </p:spPr>
+        <p:style>
+          <a:lnRef idx="2">
+            <a:schemeClr val="accent2"/>
+          </a:lnRef>
+          <a:fillRef idx="1">
+            <a:schemeClr val="lt1"/>
+          </a:fillRef>
+          <a:effectRef idx="0">
+            <a:schemeClr val="accent2"/>
+          </a:effectRef>
+          <a:fontRef idx="minor">
+            <a:schemeClr val="dk1"/>
+          </a:fontRef>
+        </p:style>
+        <p:txBody>
+          <a:bodyPr rtlCol="0" anchor="ctr"/>
+          <a:lstStyle/>
+          <a:p>
+            <a:pPr algn="ctr"/>
+            <a:r>
+              <a:rPr lang="cs-CZ" sz="2400" dirty="0" smtClean="0"/>
+              <a:t>Navigace</a:t>
+            </a:r>
+            <a:endParaRPr lang="cs-CZ" sz="2400" dirty="0"/>
+          </a:p>
+        </p:txBody>
+      </p:sp>
+      <p:cxnSp>
+        <p:nvCxnSpPr>
+          <p:cNvPr id="88" name="Přímá spojnice se šipkou 87"/>
+          <p:cNvCxnSpPr>
+            <a:stCxn id="14" idx="0"/>
+            <a:endCxn id="86" idx="2"/>
+          </p:cNvCxnSpPr>
+          <p:nvPr/>
+        </p:nvCxnSpPr>
+        <p:spPr>
+          <a:xfrm flipH="1" flipV="1">
+            <a:off x="7722620" y="1832840"/>
+            <a:ext cx="1" cy="568614"/>
+          </a:xfrm>
+          <a:prstGeom prst="straightConnector1">
+            <a:avLst/>
+          </a:prstGeom>
+          <a:ln>
+            <a:tailEnd type="triangle"/>
+          </a:ln>
+          <a:effectLst>
+            <a:outerShdw blurRad="50800" dist="38100" dir="2700000" algn="tl" rotWithShape="0">
+              <a:prstClr val="black">
+                <a:alpha val="40000"/>
+              </a:prstClr>
+            </a:outerShdw>
+          </a:effectLst>
+        </p:spPr>
+        <p:style>
+          <a:lnRef idx="2">
+            <a:schemeClr val="accent2"/>
+          </a:lnRef>
+          <a:fillRef idx="1">
+            <a:schemeClr val="lt1"/>
+          </a:fillRef>
+          <a:effectRef idx="0">
+            <a:schemeClr val="accent2"/>
+          </a:effectRef>
+          <a:fontRef idx="minor">
+            <a:schemeClr val="dk1"/>
+          </a:fontRef>
+        </p:style>
+      </p:cxnSp>
+    </p:spTree>
+    <p:extLst>
+      <p:ext uri="{BB962C8B-B14F-4D97-AF65-F5344CB8AC3E}">
+        <p14:creationId xmlns:p14="http://schemas.microsoft.com/office/powerpoint/2010/main" val="2827031763"/>
+      </p:ext>
+    </p:extLst>
+  </p:cSld>
+  <p:clrMapOvr>
+    <a:masterClrMapping/>
+  </p:clrMapOvr>
+  <p:timing>
+    <p:tnLst>
+      <p:par>
+        <p:cTn id="1" dur="indefinite" restart="never" nodeType="tmRoot"/>
+      </p:par>
+    </p:tnLst>
+  </p:timing>
+</p:sld>
+</file>
+
+<file path=ppt/slides/slide8.xml><?xml version="1.0" encoding="utf-8"?>
+<p:sld xmlns:a="http://schemas.openxmlformats.org/drawingml/2006/main" xmlns:r="http://schemas.openxmlformats.org/officeDocument/2006/relationships" xmlns:p="http://schemas.openxmlformats.org/presentationml/2006/main" show="0">
+  <p:cSld>
+    <p:spTree>
+      <p:nvGrpSpPr>
+        <p:cNvPr id="1" name=""/>
+        <p:cNvGrpSpPr/>
+        <p:nvPr/>
+      </p:nvGrpSpPr>
+      <p:grpSpPr>
+        <a:xfrm>
+          <a:off x="0" y="0"/>
+          <a:ext cx="0" cy="0"/>
+          <a:chOff x="0" y="0"/>
+          <a:chExt cx="0" cy="0"/>
+        </a:xfrm>
+      </p:grpSpPr>
+      <p:pic>
+        <p:nvPicPr>
+          <p:cNvPr id="5" name="Zástupný symbol pro obsah 4"/>
+          <p:cNvPicPr>
+            <a:picLocks noGrp="1" noChangeAspect="1"/>
+          </p:cNvPicPr>
+          <p:nvPr>
+            <p:ph idx="1"/>
+          </p:nvPr>
+        </p:nvPicPr>
+        <p:blipFill>
+          <a:blip r:embed="rId2">
+            <a:extLst>
+              <a:ext uri="{28A0092B-C50C-407E-A947-70E740481C1C}">
+                <a14:useLocalDpi xmlns:a14="http://schemas.microsoft.com/office/drawing/2010/main" val="0"/>
+              </a:ext>
+            </a:extLst>
+          </a:blip>
+          <a:stretch>
+            <a:fillRect/>
+          </a:stretch>
+        </p:blipFill>
+        <p:spPr>
+          <a:xfrm>
+            <a:off x="499749" y="147061"/>
+            <a:ext cx="7129487" cy="6384488"/>
+          </a:xfrm>
+        </p:spPr>
+      </p:pic>
+    </p:spTree>
+    <p:extLst>
+      <p:ext uri="{BB962C8B-B14F-4D97-AF65-F5344CB8AC3E}">
+        <p14:creationId xmlns:p14="http://schemas.microsoft.com/office/powerpoint/2010/main" val="292424517"/>
+      </p:ext>
+    </p:extLst>
+  </p:cSld>
+  <p:clrMapOvr>
+    <a:masterClrMapping/>
+  </p:clrMapOvr>
+  <mc:AlternateContent xmlns:mc="http://schemas.openxmlformats.org/markup-compatibility/2006">
+    <mc:Choice xmlns:p14="http://schemas.microsoft.com/office/powerpoint/2010/main" Requires="p14">
+      <p:transition spd="slow" p14:dur="2000"/>
+    </mc:Choice>
+    <mc:Fallback>
+      <p:transition spd="slow"/>
+    </mc:Fallback>
+  </mc:AlternateContent>
+  <p:timing>
+    <p:tnLst>
+      <p:par>
+        <p:cTn id="1" dur="indefinite" restart="never" nodeType="tmRoot"/>
+      </p:par>
+    </p:tnLst>
+  </p:timing>
+</p:sld>
+</file>
+
+<file path=ppt/slides/slide9.xml><?xml version="1.0" encoding="utf-8"?>
+<p:sld xmlns:a="http://schemas.openxmlformats.org/drawingml/2006/main" xmlns:r="http://schemas.openxmlformats.org/officeDocument/2006/relationships" xmlns:p="http://schemas.openxmlformats.org/presentationml/2006/main" show="0">
+  <p:cSld>
+    <p:spTree>
+      <p:nvGrpSpPr>
+        <p:cNvPr id="1" name=""/>
+        <p:cNvGrpSpPr/>
+        <p:nvPr/>
+      </p:nvGrpSpPr>
+      <p:grpSpPr>
+        <a:xfrm>
+          <a:off x="0" y="0"/>
+          <a:ext cx="0" cy="0"/>
+          <a:chOff x="0" y="0"/>
+          <a:chExt cx="0" cy="0"/>
+        </a:xfrm>
+      </p:grpSpPr>
+      <p:pic>
+        <p:nvPicPr>
+          <p:cNvPr id="10" name="Zástupný symbol pro obsah 9"/>
+          <p:cNvPicPr>
+            <a:picLocks noGrp="1" noChangeAspect="1"/>
+          </p:cNvPicPr>
+          <p:nvPr>
+            <p:ph idx="1"/>
+          </p:nvPr>
+        </p:nvPicPr>
+        <p:blipFill>
+          <a:blip r:embed="rId2">
+            <a:extLst>
+              <a:ext uri="{28A0092B-C50C-407E-A947-70E740481C1C}">
+                <a14:useLocalDpi xmlns:a14="http://schemas.microsoft.com/office/drawing/2010/main" val="0"/>
+              </a:ext>
+            </a:extLst>
+          </a:blip>
+          <a:stretch>
+            <a:fillRect/>
+          </a:stretch>
+        </p:blipFill>
+        <p:spPr>
+          <a:xfrm>
+            <a:off x="1505526" y="101599"/>
+            <a:ext cx="5828145" cy="6585527"/>
+          </a:xfrm>
+        </p:spPr>
+      </p:pic>
+    </p:spTree>
+    <p:extLst>
+      <p:ext uri="{BB962C8B-B14F-4D97-AF65-F5344CB8AC3E}">
+        <p14:creationId xmlns:p14="http://schemas.microsoft.com/office/powerpoint/2010/main" val="264051406"/>
+      </p:ext>
+    </p:extLst>
+  </p:cSld>
+  <p:clrMapOvr>
+    <a:masterClrMapping/>
+  </p:clrMapOvr>
+  <mc:AlternateContent xmlns:mc="http://schemas.openxmlformats.org/markup-compatibility/2006">
+    <mc:Choice xmlns:p14="http://schemas.microsoft.com/office/powerpoint/2010/main" Requires="p14">
+      <p:transition spd="slow" p14:dur="2000"/>
+    </mc:Choice>
+    <mc:Fallback>
+      <p:transition spd="slow"/>
+    </mc:Fallback>
+  </mc:AlternateContent>
   <p:timing>
     <p:tnLst>
       <p:par>

</xml_diff>

<commit_message>
pridani novych testovacich fotografii
</commit_message>
<xml_diff>
--- a/doc/ISP_prezentace.pptx
+++ b/doc/ISP_prezentace.pptx
@@ -10,10 +10,11 @@
     <p:sldId id="262" r:id="rId4"/>
     <p:sldId id="264" r:id="rId5"/>
     <p:sldId id="263" r:id="rId6"/>
-    <p:sldId id="265" r:id="rId7"/>
-    <p:sldId id="266" r:id="rId8"/>
-    <p:sldId id="258" r:id="rId9"/>
-    <p:sldId id="259" r:id="rId10"/>
+    <p:sldId id="267" r:id="rId7"/>
+    <p:sldId id="265" r:id="rId8"/>
+    <p:sldId id="266" r:id="rId9"/>
+    <p:sldId id="258" r:id="rId10"/>
+    <p:sldId id="259" r:id="rId11"/>
   </p:sldIdLst>
   <p:sldSz cx="12192000" cy="6858000"/>
   <p:notesSz cx="6858000" cy="9144000"/>
@@ -8223,7 +8224,7 @@
           <a:p>
             <a:fld id="{D6A286D6-9690-4A7E-B0B1-9858359D4024}" type="datetimeFigureOut">
               <a:rPr lang="cs-CZ" smtClean="0"/>
-              <a:t>30.01.2017</a:t>
+              <a:t>31.01.2017</a:t>
             </a:fld>
             <a:endParaRPr lang="cs-CZ"/>
           </a:p>
@@ -8474,7 +8475,7 @@
           <a:p>
             <a:fld id="{D6A286D6-9690-4A7E-B0B1-9858359D4024}" type="datetimeFigureOut">
               <a:rPr lang="cs-CZ" smtClean="0"/>
-              <a:t>30.01.2017</a:t>
+              <a:t>31.01.2017</a:t>
             </a:fld>
             <a:endParaRPr lang="cs-CZ"/>
           </a:p>
@@ -8788,7 +8789,7 @@
           <a:p>
             <a:fld id="{D6A286D6-9690-4A7E-B0B1-9858359D4024}" type="datetimeFigureOut">
               <a:rPr lang="cs-CZ" smtClean="0"/>
-              <a:t>30.01.2017</a:t>
+              <a:t>31.01.2017</a:t>
             </a:fld>
             <a:endParaRPr lang="cs-CZ"/>
           </a:p>
@@ -9129,7 +9130,7 @@
           <a:p>
             <a:fld id="{D6A286D6-9690-4A7E-B0B1-9858359D4024}" type="datetimeFigureOut">
               <a:rPr lang="cs-CZ" smtClean="0"/>
-              <a:t>30.01.2017</a:t>
+              <a:t>31.01.2017</a:t>
             </a:fld>
             <a:endParaRPr lang="cs-CZ"/>
           </a:p>
@@ -9443,7 +9444,7 @@
           <a:p>
             <a:fld id="{D6A286D6-9690-4A7E-B0B1-9858359D4024}" type="datetimeFigureOut">
               <a:rPr lang="cs-CZ" smtClean="0"/>
-              <a:t>30.01.2017</a:t>
+              <a:t>31.01.2017</a:t>
             </a:fld>
             <a:endParaRPr lang="cs-CZ"/>
           </a:p>
@@ -9836,7 +9837,7 @@
           <a:p>
             <a:fld id="{D6A286D6-9690-4A7E-B0B1-9858359D4024}" type="datetimeFigureOut">
               <a:rPr lang="cs-CZ" smtClean="0"/>
-              <a:t>30.01.2017</a:t>
+              <a:t>31.01.2017</a:t>
             </a:fld>
             <a:endParaRPr lang="cs-CZ"/>
           </a:p>
@@ -10006,7 +10007,7 @@
           <a:p>
             <a:fld id="{D6A286D6-9690-4A7E-B0B1-9858359D4024}" type="datetimeFigureOut">
               <a:rPr lang="cs-CZ" smtClean="0"/>
-              <a:t>30.01.2017</a:t>
+              <a:t>31.01.2017</a:t>
             </a:fld>
             <a:endParaRPr lang="cs-CZ"/>
           </a:p>
@@ -10186,7 +10187,7 @@
           <a:p>
             <a:fld id="{D6A286D6-9690-4A7E-B0B1-9858359D4024}" type="datetimeFigureOut">
               <a:rPr lang="cs-CZ" smtClean="0"/>
-              <a:t>30.01.2017</a:t>
+              <a:t>31.01.2017</a:t>
             </a:fld>
             <a:endParaRPr lang="cs-CZ"/>
           </a:p>
@@ -10362,7 +10363,7 @@
           <a:p>
             <a:fld id="{D6A286D6-9690-4A7E-B0B1-9858359D4024}" type="datetimeFigureOut">
               <a:rPr lang="cs-CZ" smtClean="0"/>
-              <a:t>30.01.2017</a:t>
+              <a:t>31.01.2017</a:t>
             </a:fld>
             <a:endParaRPr lang="cs-CZ"/>
           </a:p>
@@ -10609,7 +10610,7 @@
           <a:p>
             <a:fld id="{D6A286D6-9690-4A7E-B0B1-9858359D4024}" type="datetimeFigureOut">
               <a:rPr lang="cs-CZ" smtClean="0"/>
-              <a:t>30.01.2017</a:t>
+              <a:t>31.01.2017</a:t>
             </a:fld>
             <a:endParaRPr lang="cs-CZ"/>
           </a:p>
@@ -10841,7 +10842,7 @@
           <a:p>
             <a:fld id="{D6A286D6-9690-4A7E-B0B1-9858359D4024}" type="datetimeFigureOut">
               <a:rPr lang="cs-CZ" smtClean="0"/>
-              <a:t>30.01.2017</a:t>
+              <a:t>31.01.2017</a:t>
             </a:fld>
             <a:endParaRPr lang="cs-CZ"/>
           </a:p>
@@ -11215,7 +11216,7 @@
           <a:p>
             <a:fld id="{D6A286D6-9690-4A7E-B0B1-9858359D4024}" type="datetimeFigureOut">
               <a:rPr lang="cs-CZ" smtClean="0"/>
-              <a:t>30.01.2017</a:t>
+              <a:t>31.01.2017</a:t>
             </a:fld>
             <a:endParaRPr lang="cs-CZ"/>
           </a:p>
@@ -11338,7 +11339,7 @@
           <a:p>
             <a:fld id="{D6A286D6-9690-4A7E-B0B1-9858359D4024}" type="datetimeFigureOut">
               <a:rPr lang="cs-CZ" smtClean="0"/>
-              <a:t>30.01.2017</a:t>
+              <a:t>31.01.2017</a:t>
             </a:fld>
             <a:endParaRPr lang="cs-CZ"/>
           </a:p>
@@ -11433,7 +11434,7 @@
           <a:p>
             <a:fld id="{D6A286D6-9690-4A7E-B0B1-9858359D4024}" type="datetimeFigureOut">
               <a:rPr lang="cs-CZ" smtClean="0"/>
-              <a:t>30.01.2017</a:t>
+              <a:t>31.01.2017</a:t>
             </a:fld>
             <a:endParaRPr lang="cs-CZ"/>
           </a:p>
@@ -11688,7 +11689,7 @@
           <a:p>
             <a:fld id="{D6A286D6-9690-4A7E-B0B1-9858359D4024}" type="datetimeFigureOut">
               <a:rPr lang="cs-CZ" smtClean="0"/>
-              <a:t>30.01.2017</a:t>
+              <a:t>31.01.2017</a:t>
             </a:fld>
             <a:endParaRPr lang="cs-CZ"/>
           </a:p>
@@ -11951,7 +11952,7 @@
           <a:p>
             <a:fld id="{D6A286D6-9690-4A7E-B0B1-9858359D4024}" type="datetimeFigureOut">
               <a:rPr lang="cs-CZ" smtClean="0"/>
-              <a:t>30.01.2017</a:t>
+              <a:t>31.01.2017</a:t>
             </a:fld>
             <a:endParaRPr lang="cs-CZ"/>
           </a:p>
@@ -12694,7 +12695,7 @@
           <a:p>
             <a:fld id="{D6A286D6-9690-4A7E-B0B1-9858359D4024}" type="datetimeFigureOut">
               <a:rPr lang="cs-CZ" smtClean="0"/>
-              <a:t>30.01.2017</a:t>
+              <a:t>31.01.2017</a:t>
             </a:fld>
             <a:endParaRPr lang="cs-CZ"/>
           </a:p>
@@ -13351,6 +13352,80 @@
 </p:sld>
 </file>
 
+<file path=ppt/slides/slide10.xml><?xml version="1.0" encoding="utf-8"?>
+<p:sld xmlns:a="http://schemas.openxmlformats.org/drawingml/2006/main" xmlns:r="http://schemas.openxmlformats.org/officeDocument/2006/relationships" xmlns:p="http://schemas.openxmlformats.org/presentationml/2006/main" show="0">
+  <p:cSld>
+    <p:spTree>
+      <p:nvGrpSpPr>
+        <p:cNvPr id="1" name=""/>
+        <p:cNvGrpSpPr/>
+        <p:nvPr/>
+      </p:nvGrpSpPr>
+      <p:grpSpPr>
+        <a:xfrm>
+          <a:off x="0" y="0"/>
+          <a:ext cx="0" cy="0"/>
+          <a:chOff x="0" y="0"/>
+          <a:chExt cx="0" cy="0"/>
+        </a:xfrm>
+      </p:grpSpPr>
+      <p:pic>
+        <p:nvPicPr>
+          <p:cNvPr id="10" name="Zástupný symbol pro obsah 9"/>
+          <p:cNvPicPr>
+            <a:picLocks noGrp="1" noChangeAspect="1"/>
+          </p:cNvPicPr>
+          <p:nvPr>
+            <p:ph idx="1"/>
+          </p:nvPr>
+        </p:nvPicPr>
+        <p:blipFill>
+          <a:blip r:embed="rId2">
+            <a:extLst>
+              <a:ext uri="{28A0092B-C50C-407E-A947-70E740481C1C}">
+                <a14:useLocalDpi xmlns:a14="http://schemas.microsoft.com/office/drawing/2010/main" val="0"/>
+              </a:ext>
+            </a:extLst>
+          </a:blip>
+          <a:stretch>
+            <a:fillRect/>
+          </a:stretch>
+        </p:blipFill>
+        <p:spPr>
+          <a:xfrm>
+            <a:off x="1505526" y="101599"/>
+            <a:ext cx="5828145" cy="6585527"/>
+          </a:xfrm>
+        </p:spPr>
+      </p:pic>
+    </p:spTree>
+    <p:extLst>
+      <p:ext uri="{BB962C8B-B14F-4D97-AF65-F5344CB8AC3E}">
+        <p14:creationId xmlns:p14="http://schemas.microsoft.com/office/powerpoint/2010/main" val="264051406"/>
+      </p:ext>
+    </p:extLst>
+  </p:cSld>
+  <p:clrMapOvr>
+    <a:masterClrMapping/>
+  </p:clrMapOvr>
+  <mc:AlternateContent xmlns:mc="http://schemas.openxmlformats.org/markup-compatibility/2006" xmlns:p14="http://schemas.microsoft.com/office/powerpoint/2010/main">
+    <mc:Choice Requires="p14">
+      <p:transition spd="slow" p14:dur="2000"/>
+    </mc:Choice>
+    <mc:Fallback xmlns="">
+      <p:transition spd="slow"/>
+    </mc:Fallback>
+  </mc:AlternateContent>
+  <p:timing>
+    <p:tnLst>
+      <p:par>
+        <p:cTn id="1" dur="indefinite" restart="never" nodeType="tmRoot"/>
+      </p:par>
+    </p:tnLst>
+  </p:timing>
+</p:sld>
+</file>
+
 <file path=ppt/slides/slide2.xml><?xml version="1.0" encoding="utf-8"?>
 <p:sld xmlns:a="http://schemas.openxmlformats.org/drawingml/2006/main" xmlns:r="http://schemas.openxmlformats.org/officeDocument/2006/relationships" xmlns:p="http://schemas.openxmlformats.org/presentationml/2006/main">
   <p:cSld>
@@ -14230,11 +14305,7 @@
             <a:pPr algn="ctr"/>
             <a:r>
               <a:rPr lang="cs-CZ" sz="2400" dirty="0" smtClean="0"/>
-              <a:t>SIFT, </a:t>
-            </a:r>
-            <a:r>
-              <a:rPr lang="cs-CZ" sz="2400" dirty="0" smtClean="0"/>
-              <a:t>RANSAC</a:t>
+              <a:t>SIFT, RANSAC</a:t>
             </a:r>
             <a:r>
               <a:rPr lang="cs-CZ" sz="2400" dirty="0"/>
@@ -14340,11 +14411,7 @@
             <a:pPr algn="ctr"/>
             <a:r>
               <a:rPr lang="cs-CZ" sz="2400" dirty="0" smtClean="0"/>
-              <a:t>5-points </a:t>
-            </a:r>
-            <a:r>
-              <a:rPr lang="cs-CZ" sz="2400" dirty="0" smtClean="0"/>
-              <a:t>algoritmus</a:t>
+              <a:t>5-points algoritmus</a:t>
             </a:r>
             <a:endParaRPr lang="cs-CZ" sz="2400" dirty="0"/>
           </a:p>
@@ -14733,6 +14800,166 @@
 </file>
 
 <file path=ppt/slides/slide6.xml><?xml version="1.0" encoding="utf-8"?>
+<p:sld xmlns:a="http://schemas.openxmlformats.org/drawingml/2006/main" xmlns:r="http://schemas.openxmlformats.org/officeDocument/2006/relationships" xmlns:p="http://schemas.openxmlformats.org/presentationml/2006/main">
+  <p:cSld>
+    <p:spTree>
+      <p:nvGrpSpPr>
+        <p:cNvPr id="1" name=""/>
+        <p:cNvGrpSpPr/>
+        <p:nvPr/>
+      </p:nvGrpSpPr>
+      <p:grpSpPr>
+        <a:xfrm>
+          <a:off x="0" y="0"/>
+          <a:ext cx="0" cy="0"/>
+          <a:chOff x="0" y="0"/>
+          <a:chExt cx="0" cy="0"/>
+        </a:xfrm>
+      </p:grpSpPr>
+      <p:sp>
+        <p:nvSpPr>
+          <p:cNvPr id="2" name="Nadpis 1"/>
+          <p:cNvSpPr>
+            <a:spLocks noGrp="1"/>
+          </p:cNvSpPr>
+          <p:nvPr>
+            <p:ph type="title"/>
+          </p:nvPr>
+        </p:nvSpPr>
+        <p:spPr/>
+        <p:txBody>
+          <a:bodyPr/>
+          <a:lstStyle/>
+          <a:p>
+            <a:r>
+              <a:rPr lang="cs-CZ" dirty="0" smtClean="0">
+                <a:solidFill>
+                  <a:schemeClr val="tx1"/>
+                </a:solidFill>
+              </a:rPr>
+              <a:t>Zdroje</a:t>
+            </a:r>
+            <a:endParaRPr lang="cs-CZ" dirty="0">
+              <a:solidFill>
+                <a:schemeClr val="tx1"/>
+              </a:solidFill>
+            </a:endParaRPr>
+          </a:p>
+        </p:txBody>
+      </p:sp>
+      <p:sp>
+        <p:nvSpPr>
+          <p:cNvPr id="3" name="Zástupný symbol pro obsah 2"/>
+          <p:cNvSpPr>
+            <a:spLocks noGrp="1"/>
+          </p:cNvSpPr>
+          <p:nvPr>
+            <p:ph idx="1"/>
+          </p:nvPr>
+        </p:nvSpPr>
+        <p:spPr/>
+        <p:txBody>
+          <a:bodyPr/>
+          <a:lstStyle/>
+          <a:p>
+            <a:r>
+              <a:rPr lang="cs-CZ" dirty="0"/>
+              <a:t>BAE, </a:t>
+            </a:r>
+            <a:r>
+              <a:rPr lang="cs-CZ" dirty="0" err="1"/>
+              <a:t>Soonmin</a:t>
+            </a:r>
+            <a:r>
+              <a:rPr lang="cs-CZ" dirty="0"/>
+              <a:t>, </a:t>
+            </a:r>
+            <a:r>
+              <a:rPr lang="cs-CZ" dirty="0" err="1"/>
+              <a:t>Aseem</a:t>
+            </a:r>
+            <a:r>
+              <a:rPr lang="cs-CZ" dirty="0"/>
+              <a:t> AGARWALA a </a:t>
+            </a:r>
+            <a:r>
+              <a:rPr lang="cs-CZ" dirty="0" err="1"/>
+              <a:t>Frédo</a:t>
+            </a:r>
+            <a:r>
+              <a:rPr lang="cs-CZ" dirty="0"/>
+              <a:t> DURAND. </a:t>
+            </a:r>
+            <a:r>
+              <a:rPr lang="cs-CZ" dirty="0" err="1"/>
+              <a:t>Computational</a:t>
+            </a:r>
+            <a:r>
+              <a:rPr lang="cs-CZ" dirty="0"/>
+              <a:t> </a:t>
+            </a:r>
+            <a:r>
+              <a:rPr lang="cs-CZ" dirty="0" err="1"/>
+              <a:t>rephotography</a:t>
+            </a:r>
+            <a:r>
+              <a:rPr lang="cs-CZ" dirty="0"/>
+              <a:t>. </a:t>
+            </a:r>
+            <a:r>
+              <a:rPr lang="cs-CZ" i="1" dirty="0"/>
+              <a:t>ACM </a:t>
+            </a:r>
+            <a:r>
+              <a:rPr lang="cs-CZ" i="1" dirty="0" err="1"/>
+              <a:t>Transactions</a:t>
+            </a:r>
+            <a:r>
+              <a:rPr lang="cs-CZ" i="1" dirty="0"/>
+              <a:t> on </a:t>
+            </a:r>
+            <a:r>
+              <a:rPr lang="cs-CZ" i="1" dirty="0" err="1"/>
+              <a:t>Graphics</a:t>
+            </a:r>
+            <a:r>
+              <a:rPr lang="cs-CZ" dirty="0"/>
+              <a:t> [online]. 2010, </a:t>
+            </a:r>
+            <a:r>
+              <a:rPr lang="cs-CZ" b="1" dirty="0"/>
+              <a:t>29</a:t>
+            </a:r>
+            <a:r>
+              <a:rPr lang="cs-CZ" dirty="0"/>
+              <a:t>(3), 1-15 [cit. </a:t>
+            </a:r>
+            <a:r>
+              <a:rPr lang="cs-CZ" dirty="0" smtClean="0"/>
+              <a:t>2017-01-20]. </a:t>
+            </a:r>
+            <a:r>
+              <a:rPr lang="cs-CZ" dirty="0"/>
+              <a:t>DOI: 10.1145/1805964.1805968. ISSN 07300301. Dostupné z: http://portal.acm.org/citation.cfm?doid=1805964.1805968</a:t>
+            </a:r>
+            <a:endParaRPr lang="cs-CZ" dirty="0"/>
+          </a:p>
+        </p:txBody>
+      </p:sp>
+    </p:spTree>
+    <p:extLst>
+      <p:ext uri="{BB962C8B-B14F-4D97-AF65-F5344CB8AC3E}">
+        <p14:creationId xmlns:p14="http://schemas.microsoft.com/office/powerpoint/2010/main" val="3826284725"/>
+      </p:ext>
+    </p:extLst>
+  </p:cSld>
+  <p:clrMapOvr>
+    <a:masterClrMapping/>
+  </p:clrMapOvr>
+</p:sld>
+</file>
+
+<file path=ppt/slides/slide7.xml><?xml version="1.0" encoding="utf-8"?>
 <p:sld xmlns:a="http://schemas.openxmlformats.org/drawingml/2006/main" xmlns:r="http://schemas.openxmlformats.org/officeDocument/2006/relationships" xmlns:p="http://schemas.openxmlformats.org/presentationml/2006/main" show="0">
   <p:cSld>
     <p:spTree>
@@ -14866,7 +15093,7 @@
 </p:sld>
 </file>
 
-<file path=ppt/slides/slide7.xml><?xml version="1.0" encoding="utf-8"?>
+<file path=ppt/slides/slide8.xml><?xml version="1.0" encoding="utf-8"?>
 <p:sld xmlns:a="http://schemas.openxmlformats.org/drawingml/2006/main" xmlns:r="http://schemas.openxmlformats.org/officeDocument/2006/relationships" xmlns:p="http://schemas.openxmlformats.org/presentationml/2006/main" show="0">
   <p:cSld>
     <p:spTree>
@@ -14963,7 +15190,7 @@
 </p:sld>
 </file>
 
-<file path=ppt/slides/slide8.xml><?xml version="1.0" encoding="utf-8"?>
+<file path=ppt/slides/slide9.xml><?xml version="1.0" encoding="utf-8"?>
 <p:sld xmlns:a="http://schemas.openxmlformats.org/drawingml/2006/main" xmlns:r="http://schemas.openxmlformats.org/officeDocument/2006/relationships" xmlns:p="http://schemas.openxmlformats.org/presentationml/2006/main" show="0">
   <p:cSld>
     <p:spTree>
@@ -15013,80 +15240,6 @@
     <p:extLst>
       <p:ext uri="{BB962C8B-B14F-4D97-AF65-F5344CB8AC3E}">
         <p14:creationId xmlns:p14="http://schemas.microsoft.com/office/powerpoint/2010/main" val="292424517"/>
-      </p:ext>
-    </p:extLst>
-  </p:cSld>
-  <p:clrMapOvr>
-    <a:masterClrMapping/>
-  </p:clrMapOvr>
-  <mc:AlternateContent xmlns:mc="http://schemas.openxmlformats.org/markup-compatibility/2006" xmlns:p14="http://schemas.microsoft.com/office/powerpoint/2010/main">
-    <mc:Choice Requires="p14">
-      <p:transition spd="slow" p14:dur="2000"/>
-    </mc:Choice>
-    <mc:Fallback xmlns="">
-      <p:transition spd="slow"/>
-    </mc:Fallback>
-  </mc:AlternateContent>
-  <p:timing>
-    <p:tnLst>
-      <p:par>
-        <p:cTn id="1" dur="indefinite" restart="never" nodeType="tmRoot"/>
-      </p:par>
-    </p:tnLst>
-  </p:timing>
-</p:sld>
-</file>
-
-<file path=ppt/slides/slide9.xml><?xml version="1.0" encoding="utf-8"?>
-<p:sld xmlns:a="http://schemas.openxmlformats.org/drawingml/2006/main" xmlns:r="http://schemas.openxmlformats.org/officeDocument/2006/relationships" xmlns:p="http://schemas.openxmlformats.org/presentationml/2006/main" show="0">
-  <p:cSld>
-    <p:spTree>
-      <p:nvGrpSpPr>
-        <p:cNvPr id="1" name=""/>
-        <p:cNvGrpSpPr/>
-        <p:nvPr/>
-      </p:nvGrpSpPr>
-      <p:grpSpPr>
-        <a:xfrm>
-          <a:off x="0" y="0"/>
-          <a:ext cx="0" cy="0"/>
-          <a:chOff x="0" y="0"/>
-          <a:chExt cx="0" cy="0"/>
-        </a:xfrm>
-      </p:grpSpPr>
-      <p:pic>
-        <p:nvPicPr>
-          <p:cNvPr id="10" name="Zástupný symbol pro obsah 9"/>
-          <p:cNvPicPr>
-            <a:picLocks noGrp="1" noChangeAspect="1"/>
-          </p:cNvPicPr>
-          <p:nvPr>
-            <p:ph idx="1"/>
-          </p:nvPr>
-        </p:nvPicPr>
-        <p:blipFill>
-          <a:blip r:embed="rId2">
-            <a:extLst>
-              <a:ext uri="{28A0092B-C50C-407E-A947-70E740481C1C}">
-                <a14:useLocalDpi xmlns:a14="http://schemas.microsoft.com/office/drawing/2010/main" val="0"/>
-              </a:ext>
-            </a:extLst>
-          </a:blip>
-          <a:stretch>
-            <a:fillRect/>
-          </a:stretch>
-        </p:blipFill>
-        <p:spPr>
-          <a:xfrm>
-            <a:off x="1505526" y="101599"/>
-            <a:ext cx="5828145" cy="6585527"/>
-          </a:xfrm>
-        </p:spPr>
-      </p:pic>
-    </p:spTree>
-    <p:extLst>
-      <p:ext uri="{BB962C8B-B14F-4D97-AF65-F5344CB8AC3E}">
-        <p14:creationId xmlns:p14="http://schemas.microsoft.com/office/powerpoint/2010/main" val="264051406"/>
       </p:ext>
     </p:extLst>
   </p:cSld>

</xml_diff>